<commit_message>
undeleted Shiva's beautiful images.
</commit_message>
<xml_diff>
--- a/papers/ICRA2016/pictures/Drawings.pptx
+++ b/papers/ICRA2016/pictures/Drawings.pptx
@@ -7,6 +7,13 @@
   <p:sldIdLst>
     <p:sldId id="256" r:id="rId2"/>
     <p:sldId id="257" r:id="rId3"/>
+    <p:sldId id="258" r:id="rId4"/>
+    <p:sldId id="259" r:id="rId5"/>
+    <p:sldId id="264" r:id="rId6"/>
+    <p:sldId id="261" r:id="rId7"/>
+    <p:sldId id="260" r:id="rId8"/>
+    <p:sldId id="262" r:id="rId9"/>
+    <p:sldId id="263" r:id="rId10"/>
   </p:sldIdLst>
   <p:sldSz cx="9144000" cy="6858000" type="screen4x3"/>
   <p:notesSz cx="6858000" cy="9144000"/>
@@ -289,7 +296,7 @@
           <a:p>
             <a:fld id="{0DBF645A-F2FA-6B44-9CD1-4A4883394FAA}" type="datetimeFigureOut">
               <a:rPr lang="en-US" smtClean="0"/>
-              <a:t>8/4/15</a:t>
+              <a:t>9/15/15</a:t>
             </a:fld>
             <a:endParaRPr lang="en-US"/>
           </a:p>
@@ -459,7 +466,7 @@
           <a:p>
             <a:fld id="{0DBF645A-F2FA-6B44-9CD1-4A4883394FAA}" type="datetimeFigureOut">
               <a:rPr lang="en-US" smtClean="0"/>
-              <a:t>8/4/15</a:t>
+              <a:t>9/15/15</a:t>
             </a:fld>
             <a:endParaRPr lang="en-US"/>
           </a:p>
@@ -639,7 +646,7 @@
           <a:p>
             <a:fld id="{0DBF645A-F2FA-6B44-9CD1-4A4883394FAA}" type="datetimeFigureOut">
               <a:rPr lang="en-US" smtClean="0"/>
-              <a:t>8/4/15</a:t>
+              <a:t>9/15/15</a:t>
             </a:fld>
             <a:endParaRPr lang="en-US"/>
           </a:p>
@@ -809,7 +816,7 @@
           <a:p>
             <a:fld id="{0DBF645A-F2FA-6B44-9CD1-4A4883394FAA}" type="datetimeFigureOut">
               <a:rPr lang="en-US" smtClean="0"/>
-              <a:t>8/4/15</a:t>
+              <a:t>9/15/15</a:t>
             </a:fld>
             <a:endParaRPr lang="en-US"/>
           </a:p>
@@ -1055,7 +1062,7 @@
           <a:p>
             <a:fld id="{0DBF645A-F2FA-6B44-9CD1-4A4883394FAA}" type="datetimeFigureOut">
               <a:rPr lang="en-US" smtClean="0"/>
-              <a:t>8/4/15</a:t>
+              <a:t>9/15/15</a:t>
             </a:fld>
             <a:endParaRPr lang="en-US"/>
           </a:p>
@@ -1343,7 +1350,7 @@
           <a:p>
             <a:fld id="{0DBF645A-F2FA-6B44-9CD1-4A4883394FAA}" type="datetimeFigureOut">
               <a:rPr lang="en-US" smtClean="0"/>
-              <a:t>8/4/15</a:t>
+              <a:t>9/15/15</a:t>
             </a:fld>
             <a:endParaRPr lang="en-US"/>
           </a:p>
@@ -1765,7 +1772,7 @@
           <a:p>
             <a:fld id="{0DBF645A-F2FA-6B44-9CD1-4A4883394FAA}" type="datetimeFigureOut">
               <a:rPr lang="en-US" smtClean="0"/>
-              <a:t>8/4/15</a:t>
+              <a:t>9/15/15</a:t>
             </a:fld>
             <a:endParaRPr lang="en-US"/>
           </a:p>
@@ -1883,7 +1890,7 @@
           <a:p>
             <a:fld id="{0DBF645A-F2FA-6B44-9CD1-4A4883394FAA}" type="datetimeFigureOut">
               <a:rPr lang="en-US" smtClean="0"/>
-              <a:t>8/4/15</a:t>
+              <a:t>9/15/15</a:t>
             </a:fld>
             <a:endParaRPr lang="en-US"/>
           </a:p>
@@ -1978,7 +1985,7 @@
           <a:p>
             <a:fld id="{0DBF645A-F2FA-6B44-9CD1-4A4883394FAA}" type="datetimeFigureOut">
               <a:rPr lang="en-US" smtClean="0"/>
-              <a:t>8/4/15</a:t>
+              <a:t>9/15/15</a:t>
             </a:fld>
             <a:endParaRPr lang="en-US"/>
           </a:p>
@@ -2255,7 +2262,7 @@
           <a:p>
             <a:fld id="{0DBF645A-F2FA-6B44-9CD1-4A4883394FAA}" type="datetimeFigureOut">
               <a:rPr lang="en-US" smtClean="0"/>
-              <a:t>8/4/15</a:t>
+              <a:t>9/15/15</a:t>
             </a:fld>
             <a:endParaRPr lang="en-US"/>
           </a:p>
@@ -2508,7 +2515,7 @@
           <a:p>
             <a:fld id="{0DBF645A-F2FA-6B44-9CD1-4A4883394FAA}" type="datetimeFigureOut">
               <a:rPr lang="en-US" smtClean="0"/>
-              <a:t>8/4/15</a:t>
+              <a:t>9/15/15</a:t>
             </a:fld>
             <a:endParaRPr lang="en-US"/>
           </a:p>
@@ -2721,7 +2728,7 @@
           <a:p>
             <a:fld id="{0DBF645A-F2FA-6B44-9CD1-4A4883394FAA}" type="datetimeFigureOut">
               <a:rPr lang="en-US" smtClean="0"/>
-              <a:t>8/4/15</a:t>
+              <a:t>9/15/15</a:t>
             </a:fld>
             <a:endParaRPr lang="en-US"/>
           </a:p>
@@ -3096,601 +3103,774 @@
           <a:chExt cx="0" cy="0"/>
         </a:xfrm>
       </p:grpSpPr>
-      <p:sp>
-        <p:nvSpPr>
-          <p:cNvPr id="4" name="Oval 3"/>
-          <p:cNvSpPr/>
-          <p:nvPr/>
-        </p:nvSpPr>
-        <p:spPr>
-          <a:xfrm>
-            <a:off x="3694713" y="2309368"/>
-            <a:ext cx="1187585" cy="1187675"/>
-          </a:xfrm>
-          <a:prstGeom prst="ellipse">
-            <a:avLst/>
-          </a:prstGeom>
-          <a:solidFill>
-            <a:schemeClr val="tx2"/>
-          </a:solidFill>
-          <a:ln>
+      <p:grpSp>
+        <p:nvGrpSpPr>
+          <p:cNvPr id="6" name="Group 5"/>
+          <p:cNvGrpSpPr/>
+          <p:nvPr/>
+        </p:nvGrpSpPr>
+        <p:grpSpPr>
+          <a:xfrm>
+            <a:off x="2292701" y="1113101"/>
+            <a:ext cx="4552413" cy="3966976"/>
+            <a:chOff x="2292701" y="1113101"/>
+            <a:chExt cx="4552413" cy="3966976"/>
+          </a:xfrm>
+        </p:grpSpPr>
+        <p:sp>
+          <p:nvSpPr>
+            <p:cNvPr id="4" name="Oval 3"/>
+            <p:cNvSpPr/>
+            <p:nvPr/>
+          </p:nvSpPr>
+          <p:spPr>
+            <a:xfrm>
+              <a:off x="3694713" y="3150104"/>
+              <a:ext cx="1187585" cy="1187675"/>
+            </a:xfrm>
+            <a:prstGeom prst="ellipse">
+              <a:avLst/>
+            </a:prstGeom>
+            <a:solidFill>
+              <a:schemeClr val="tx2"/>
+            </a:solidFill>
+            <a:ln>
+              <a:noFill/>
+            </a:ln>
+          </p:spPr>
+          <p:style>
+            <a:lnRef idx="1">
+              <a:schemeClr val="accent1"/>
+            </a:lnRef>
+            <a:fillRef idx="3">
+              <a:schemeClr val="accent1"/>
+            </a:fillRef>
+            <a:effectRef idx="2">
+              <a:schemeClr val="accent1"/>
+            </a:effectRef>
+            <a:fontRef idx="minor">
+              <a:schemeClr val="lt1"/>
+            </a:fontRef>
+          </p:style>
+          <p:txBody>
+            <a:bodyPr rtlCol="0" anchor="ctr"/>
+            <a:lstStyle/>
+            <a:p>
+              <a:pPr algn="ctr"/>
+              <a:endParaRPr lang="en-US">
+                <a:latin typeface="Times New Roman"/>
+                <a:cs typeface="Times New Roman"/>
+              </a:endParaRPr>
+            </a:p>
+          </p:txBody>
+        </p:sp>
+        <p:sp>
+          <p:nvSpPr>
+            <p:cNvPr id="5" name="Rectangle 4"/>
+            <p:cNvSpPr/>
+            <p:nvPr/>
+          </p:nvSpPr>
+          <p:spPr>
+            <a:xfrm>
+              <a:off x="2292701" y="4337780"/>
+              <a:ext cx="4552413" cy="742297"/>
+            </a:xfrm>
+            <a:prstGeom prst="rect">
+              <a:avLst/>
+            </a:prstGeom>
+            <a:solidFill>
+              <a:schemeClr val="accent2">
+                <a:lumMod val="75000"/>
+              </a:schemeClr>
+            </a:solidFill>
+            <a:ln>
+              <a:noFill/>
+            </a:ln>
+          </p:spPr>
+          <p:style>
+            <a:lnRef idx="1">
+              <a:schemeClr val="accent1"/>
+            </a:lnRef>
+            <a:fillRef idx="3">
+              <a:schemeClr val="accent1"/>
+            </a:fillRef>
+            <a:effectRef idx="2">
+              <a:schemeClr val="accent1"/>
+            </a:effectRef>
+            <a:fontRef idx="minor">
+              <a:schemeClr val="lt1"/>
+            </a:fontRef>
+          </p:style>
+          <p:txBody>
+            <a:bodyPr rtlCol="0" anchor="ctr"/>
+            <a:lstStyle/>
+            <a:p>
+              <a:pPr algn="ctr"/>
+              <a:endParaRPr lang="en-US">
+                <a:latin typeface="Times New Roman"/>
+                <a:cs typeface="Times New Roman"/>
+              </a:endParaRPr>
+            </a:p>
+          </p:txBody>
+        </p:sp>
+        <p:cxnSp>
+          <p:nvCxnSpPr>
+            <p:cNvPr id="7" name="Straight Arrow Connector 6"/>
+            <p:cNvCxnSpPr/>
+            <p:nvPr/>
+          </p:nvCxnSpPr>
+          <p:spPr>
+            <a:xfrm>
+              <a:off x="4288509" y="3710943"/>
+              <a:ext cx="1979310" cy="659820"/>
+            </a:xfrm>
+            <a:prstGeom prst="straightConnector1">
+              <a:avLst/>
+            </a:prstGeom>
+            <a:ln w="57150" cmpd="sng">
+              <a:solidFill>
+                <a:schemeClr val="tx1"/>
+              </a:solidFill>
+              <a:tailEnd type="arrow"/>
+            </a:ln>
+          </p:spPr>
+          <p:style>
+            <a:lnRef idx="2">
+              <a:schemeClr val="accent1"/>
+            </a:lnRef>
+            <a:fillRef idx="0">
+              <a:schemeClr val="accent1"/>
+            </a:fillRef>
+            <a:effectRef idx="1">
+              <a:schemeClr val="accent1"/>
+            </a:effectRef>
+            <a:fontRef idx="minor">
+              <a:schemeClr val="tx1"/>
+            </a:fontRef>
+          </p:style>
+        </p:cxnSp>
+        <p:cxnSp>
+          <p:nvCxnSpPr>
+            <p:cNvPr id="10" name="Straight Arrow Connector 9"/>
+            <p:cNvCxnSpPr/>
+            <p:nvPr/>
+          </p:nvCxnSpPr>
+          <p:spPr>
+            <a:xfrm>
+              <a:off x="4288509" y="3710943"/>
+              <a:ext cx="1979310" cy="0"/>
+            </a:xfrm>
+            <a:prstGeom prst="straightConnector1">
+              <a:avLst/>
+            </a:prstGeom>
+            <a:ln w="57150" cmpd="sng">
+              <a:solidFill>
+                <a:srgbClr val="000000"/>
+              </a:solidFill>
+              <a:tailEnd type="arrow"/>
+            </a:ln>
+          </p:spPr>
+          <p:style>
+            <a:lnRef idx="2">
+              <a:schemeClr val="accent1"/>
+            </a:lnRef>
+            <a:fillRef idx="0">
+              <a:schemeClr val="accent1"/>
+            </a:fillRef>
+            <a:effectRef idx="1">
+              <a:schemeClr val="accent1"/>
+            </a:effectRef>
+            <a:fontRef idx="minor">
+              <a:schemeClr val="tx1"/>
+            </a:fontRef>
+          </p:style>
+        </p:cxnSp>
+        <p:cxnSp>
+          <p:nvCxnSpPr>
+            <p:cNvPr id="12" name="Straight Arrow Connector 11"/>
+            <p:cNvCxnSpPr/>
+            <p:nvPr/>
+          </p:nvCxnSpPr>
+          <p:spPr>
+            <a:xfrm>
+              <a:off x="4288509" y="3710943"/>
+              <a:ext cx="0" cy="659820"/>
+            </a:xfrm>
+            <a:prstGeom prst="straightConnector1">
+              <a:avLst/>
+            </a:prstGeom>
+            <a:ln w="57150" cmpd="sng">
+              <a:solidFill>
+                <a:srgbClr val="000000"/>
+              </a:solidFill>
+              <a:tailEnd type="arrow"/>
+            </a:ln>
+          </p:spPr>
+          <p:style>
+            <a:lnRef idx="2">
+              <a:schemeClr val="accent1"/>
+            </a:lnRef>
+            <a:fillRef idx="0">
+              <a:schemeClr val="accent1"/>
+            </a:fillRef>
+            <a:effectRef idx="1">
+              <a:schemeClr val="accent1"/>
+            </a:effectRef>
+            <a:fontRef idx="minor">
+              <a:schemeClr val="tx1"/>
+            </a:fontRef>
+          </p:style>
+        </p:cxnSp>
+        <p:cxnSp>
+          <p:nvCxnSpPr>
+            <p:cNvPr id="13" name="Straight Arrow Connector 12"/>
+            <p:cNvCxnSpPr/>
+            <p:nvPr/>
+          </p:nvCxnSpPr>
+          <p:spPr>
+            <a:xfrm flipV="1">
+              <a:off x="4288509" y="3051123"/>
+              <a:ext cx="0" cy="659820"/>
+            </a:xfrm>
+            <a:prstGeom prst="straightConnector1">
+              <a:avLst/>
+            </a:prstGeom>
+            <a:ln w="57150" cmpd="sng">
+              <a:solidFill>
+                <a:srgbClr val="FF6600"/>
+              </a:solidFill>
+              <a:tailEnd type="arrow"/>
+            </a:ln>
+          </p:spPr>
+          <p:style>
+            <a:lnRef idx="2">
+              <a:schemeClr val="accent1"/>
+            </a:lnRef>
+            <a:fillRef idx="0">
+              <a:schemeClr val="accent1"/>
+            </a:fillRef>
+            <a:effectRef idx="1">
+              <a:schemeClr val="accent1"/>
+            </a:effectRef>
+            <a:fontRef idx="minor">
+              <a:schemeClr val="tx1"/>
+            </a:fontRef>
+          </p:style>
+        </p:cxnSp>
+        <p:cxnSp>
+          <p:nvCxnSpPr>
+            <p:cNvPr id="15" name="Straight Arrow Connector 14"/>
+            <p:cNvCxnSpPr/>
+            <p:nvPr/>
+          </p:nvCxnSpPr>
+          <p:spPr>
+            <a:xfrm flipH="1">
+              <a:off x="3152463" y="3710943"/>
+              <a:ext cx="1119548" cy="16504"/>
+            </a:xfrm>
+            <a:prstGeom prst="straightConnector1">
+              <a:avLst/>
+            </a:prstGeom>
+            <a:ln w="57150" cmpd="sng">
+              <a:solidFill>
+                <a:srgbClr val="FF0000"/>
+              </a:solidFill>
+              <a:tailEnd type="arrow"/>
+            </a:ln>
+          </p:spPr>
+          <p:style>
+            <a:lnRef idx="2">
+              <a:schemeClr val="accent1"/>
+            </a:lnRef>
+            <a:fillRef idx="0">
+              <a:schemeClr val="accent1"/>
+            </a:fillRef>
+            <a:effectRef idx="1">
+              <a:schemeClr val="accent1"/>
+            </a:effectRef>
+            <a:fontRef idx="minor">
+              <a:schemeClr val="tx1"/>
+            </a:fontRef>
+          </p:style>
+        </p:cxnSp>
+        <p:sp>
+          <p:nvSpPr>
+            <p:cNvPr id="18" name="TextBox 17"/>
+            <p:cNvSpPr txBox="1"/>
+            <p:nvPr/>
+          </p:nvSpPr>
+          <p:spPr>
+            <a:xfrm>
+              <a:off x="4032844" y="2259348"/>
+              <a:ext cx="519569" cy="707886"/>
+            </a:xfrm>
+            <a:prstGeom prst="rect">
+              <a:avLst/>
+            </a:prstGeom>
             <a:noFill/>
-          </a:ln>
-        </p:spPr>
-        <p:style>
-          <a:lnRef idx="1">
-            <a:schemeClr val="accent1"/>
-          </a:lnRef>
-          <a:fillRef idx="3">
-            <a:schemeClr val="accent1"/>
-          </a:fillRef>
-          <a:effectRef idx="2">
-            <a:schemeClr val="accent1"/>
-          </a:effectRef>
-          <a:fontRef idx="minor">
-            <a:schemeClr val="lt1"/>
-          </a:fontRef>
-        </p:style>
-        <p:txBody>
-          <a:bodyPr rtlCol="0" anchor="ctr"/>
-          <a:lstStyle/>
-          <a:p>
-            <a:pPr algn="ctr"/>
-            <a:endParaRPr lang="en-US"/>
-          </a:p>
-        </p:txBody>
-      </p:sp>
-      <p:sp>
-        <p:nvSpPr>
-          <p:cNvPr id="5" name="Rectangle 4"/>
-          <p:cNvSpPr/>
-          <p:nvPr/>
-        </p:nvSpPr>
-        <p:spPr>
-          <a:xfrm>
-            <a:off x="2292701" y="3497044"/>
-            <a:ext cx="4552413" cy="742297"/>
-          </a:xfrm>
-          <a:prstGeom prst="rect">
-            <a:avLst/>
-          </a:prstGeom>
-          <a:solidFill>
-            <a:schemeClr val="accent2">
-              <a:lumMod val="75000"/>
-            </a:schemeClr>
-          </a:solidFill>
-          <a:ln>
+            <a:ln>
+              <a:noFill/>
+            </a:ln>
+          </p:spPr>
+          <p:txBody>
+            <a:bodyPr wrap="square" rtlCol="0">
+              <a:spAutoFit/>
+            </a:bodyPr>
+            <a:lstStyle/>
+            <a:p>
+              <a:r>
+                <a:rPr lang="en-US" sz="4000" dirty="0">
+                  <a:solidFill>
+                    <a:srgbClr val="FF6600"/>
+                  </a:solidFill>
+                  <a:latin typeface="Times New Roman"/>
+                  <a:cs typeface="Times New Roman"/>
+                </a:rPr>
+                <a:t>N</a:t>
+              </a:r>
+            </a:p>
+          </p:txBody>
+        </p:sp>
+        <p:sp>
+          <p:nvSpPr>
+            <p:cNvPr id="19" name="TextBox 18"/>
+            <p:cNvSpPr txBox="1"/>
+            <p:nvPr/>
+          </p:nvSpPr>
+          <p:spPr>
+            <a:xfrm>
+              <a:off x="2733921" y="2967234"/>
+              <a:ext cx="1298923" cy="707886"/>
+            </a:xfrm>
+            <a:prstGeom prst="rect">
+              <a:avLst/>
+            </a:prstGeom>
             <a:noFill/>
-          </a:ln>
-        </p:spPr>
-        <p:style>
-          <a:lnRef idx="1">
-            <a:schemeClr val="accent1"/>
-          </a:lnRef>
-          <a:fillRef idx="3">
-            <a:schemeClr val="accent1"/>
-          </a:fillRef>
-          <a:effectRef idx="2">
-            <a:schemeClr val="accent1"/>
-          </a:effectRef>
-          <a:fontRef idx="minor">
-            <a:schemeClr val="lt1"/>
-          </a:fontRef>
-        </p:style>
-        <p:txBody>
-          <a:bodyPr rtlCol="0" anchor="ctr"/>
-          <a:lstStyle/>
-          <a:p>
-            <a:pPr algn="ctr"/>
-            <a:endParaRPr lang="en-US"/>
-          </a:p>
-        </p:txBody>
-      </p:sp>
-      <p:cxnSp>
-        <p:nvCxnSpPr>
-          <p:cNvPr id="7" name="Straight Arrow Connector 6"/>
-          <p:cNvCxnSpPr/>
-          <p:nvPr/>
-        </p:nvCxnSpPr>
-        <p:spPr>
-          <a:xfrm>
-            <a:off x="4288509" y="2870207"/>
-            <a:ext cx="1979310" cy="659820"/>
-          </a:xfrm>
-          <a:prstGeom prst="straightConnector1">
-            <a:avLst/>
-          </a:prstGeom>
-          <a:ln w="57150" cmpd="sng">
-            <a:solidFill>
-              <a:schemeClr val="tx1"/>
-            </a:solidFill>
-            <a:tailEnd type="arrow"/>
-          </a:ln>
-        </p:spPr>
-        <p:style>
-          <a:lnRef idx="2">
-            <a:schemeClr val="accent1"/>
-          </a:lnRef>
-          <a:fillRef idx="0">
-            <a:schemeClr val="accent1"/>
-          </a:fillRef>
-          <a:effectRef idx="1">
-            <a:schemeClr val="accent1"/>
-          </a:effectRef>
-          <a:fontRef idx="minor">
-            <a:schemeClr val="tx1"/>
-          </a:fontRef>
-        </p:style>
-      </p:cxnSp>
-      <p:cxnSp>
-        <p:nvCxnSpPr>
-          <p:cNvPr id="10" name="Straight Arrow Connector 9"/>
-          <p:cNvCxnSpPr/>
-          <p:nvPr/>
-        </p:nvCxnSpPr>
-        <p:spPr>
-          <a:xfrm>
-            <a:off x="4288509" y="2870207"/>
-            <a:ext cx="1979310" cy="0"/>
-          </a:xfrm>
-          <a:prstGeom prst="straightConnector1">
-            <a:avLst/>
-          </a:prstGeom>
-          <a:ln w="57150" cmpd="sng">
-            <a:solidFill>
-              <a:srgbClr val="000000"/>
-            </a:solidFill>
-            <a:tailEnd type="arrow"/>
-          </a:ln>
-        </p:spPr>
-        <p:style>
-          <a:lnRef idx="2">
-            <a:schemeClr val="accent1"/>
-          </a:lnRef>
-          <a:fillRef idx="0">
-            <a:schemeClr val="accent1"/>
-          </a:fillRef>
-          <a:effectRef idx="1">
-            <a:schemeClr val="accent1"/>
-          </a:effectRef>
-          <a:fontRef idx="minor">
-            <a:schemeClr val="tx1"/>
-          </a:fontRef>
-        </p:style>
-      </p:cxnSp>
-      <p:cxnSp>
-        <p:nvCxnSpPr>
-          <p:cNvPr id="12" name="Straight Arrow Connector 11"/>
-          <p:cNvCxnSpPr/>
-          <p:nvPr/>
-        </p:nvCxnSpPr>
-        <p:spPr>
-          <a:xfrm>
-            <a:off x="4288509" y="2870207"/>
-            <a:ext cx="0" cy="659820"/>
-          </a:xfrm>
-          <a:prstGeom prst="straightConnector1">
-            <a:avLst/>
-          </a:prstGeom>
-          <a:ln w="57150" cmpd="sng">
-            <a:solidFill>
-              <a:srgbClr val="000000"/>
-            </a:solidFill>
-            <a:tailEnd type="arrow"/>
-          </a:ln>
-        </p:spPr>
-        <p:style>
-          <a:lnRef idx="2">
-            <a:schemeClr val="accent1"/>
-          </a:lnRef>
-          <a:fillRef idx="0">
-            <a:schemeClr val="accent1"/>
-          </a:fillRef>
-          <a:effectRef idx="1">
-            <a:schemeClr val="accent1"/>
-          </a:effectRef>
-          <a:fontRef idx="minor">
-            <a:schemeClr val="tx1"/>
-          </a:fontRef>
-        </p:style>
-      </p:cxnSp>
-      <p:cxnSp>
-        <p:nvCxnSpPr>
-          <p:cNvPr id="13" name="Straight Arrow Connector 12"/>
-          <p:cNvCxnSpPr/>
-          <p:nvPr/>
-        </p:nvCxnSpPr>
-        <p:spPr>
-          <a:xfrm flipV="1">
-            <a:off x="4288509" y="2210387"/>
-            <a:ext cx="0" cy="659820"/>
-          </a:xfrm>
-          <a:prstGeom prst="straightConnector1">
-            <a:avLst/>
-          </a:prstGeom>
-          <a:ln w="57150" cmpd="sng">
-            <a:solidFill>
-              <a:srgbClr val="FF6600"/>
-            </a:solidFill>
-            <a:tailEnd type="arrow"/>
-          </a:ln>
-        </p:spPr>
-        <p:style>
-          <a:lnRef idx="2">
-            <a:schemeClr val="accent1"/>
-          </a:lnRef>
-          <a:fillRef idx="0">
-            <a:schemeClr val="accent1"/>
-          </a:fillRef>
-          <a:effectRef idx="1">
-            <a:schemeClr val="accent1"/>
-          </a:effectRef>
-          <a:fontRef idx="minor">
-            <a:schemeClr val="tx1"/>
-          </a:fontRef>
-        </p:style>
-      </p:cxnSp>
-      <p:cxnSp>
-        <p:nvCxnSpPr>
-          <p:cNvPr id="15" name="Straight Arrow Connector 14"/>
-          <p:cNvCxnSpPr/>
-          <p:nvPr/>
-        </p:nvCxnSpPr>
-        <p:spPr>
-          <a:xfrm flipH="1">
-            <a:off x="2292701" y="2870207"/>
-            <a:ext cx="1979310" cy="16504"/>
-          </a:xfrm>
-          <a:prstGeom prst="straightConnector1">
-            <a:avLst/>
-          </a:prstGeom>
-          <a:ln w="57150" cmpd="sng">
-            <a:solidFill>
-              <a:srgbClr val="FF0000"/>
-            </a:solidFill>
-            <a:tailEnd type="arrow"/>
-          </a:ln>
-        </p:spPr>
-        <p:style>
-          <a:lnRef idx="2">
-            <a:schemeClr val="accent1"/>
-          </a:lnRef>
-          <a:fillRef idx="0">
-            <a:schemeClr val="accent1"/>
-          </a:fillRef>
-          <a:effectRef idx="1">
-            <a:schemeClr val="accent1"/>
-          </a:effectRef>
-          <a:fontRef idx="minor">
-            <a:schemeClr val="tx1"/>
-          </a:fontRef>
-        </p:style>
-      </p:cxnSp>
-      <p:sp>
-        <p:nvSpPr>
-          <p:cNvPr id="18" name="TextBox 17"/>
-          <p:cNvSpPr txBox="1"/>
-          <p:nvPr/>
-        </p:nvSpPr>
-        <p:spPr>
-          <a:xfrm>
-            <a:off x="4032844" y="1418612"/>
-            <a:ext cx="519569" cy="707886"/>
-          </a:xfrm>
-          <a:prstGeom prst="rect">
-            <a:avLst/>
-          </a:prstGeom>
-          <a:noFill/>
-          <a:ln>
-            <a:noFill/>
-          </a:ln>
-        </p:spPr>
-        <p:txBody>
-          <a:bodyPr wrap="square" rtlCol="0">
-            <a:spAutoFit/>
-          </a:bodyPr>
-          <a:lstStyle/>
-          <a:p>
-            <a:r>
-              <a:rPr lang="en-US" sz="4000" dirty="0">
-                <a:solidFill>
-                  <a:srgbClr val="FF6600"/>
-                </a:solidFill>
-              </a:rPr>
-              <a:t>N</a:t>
-            </a:r>
-          </a:p>
-        </p:txBody>
-      </p:sp>
-      <p:sp>
-        <p:nvSpPr>
-          <p:cNvPr id="19" name="TextBox 18"/>
-          <p:cNvSpPr txBox="1"/>
-          <p:nvPr/>
-        </p:nvSpPr>
-        <p:spPr>
-          <a:xfrm>
-            <a:off x="2032916" y="2126498"/>
-            <a:ext cx="1298923" cy="707886"/>
-          </a:xfrm>
-          <a:prstGeom prst="rect">
-            <a:avLst/>
-          </a:prstGeom>
-          <a:noFill/>
-        </p:spPr>
-        <p:txBody>
-          <a:bodyPr wrap="square" rtlCol="0">
-            <a:spAutoFit/>
-          </a:bodyPr>
-          <a:lstStyle/>
-          <a:p>
-            <a:r>
-              <a:rPr lang="en-US" sz="4000" dirty="0" err="1" smtClean="0">
+          </p:spPr>
+          <p:txBody>
+            <a:bodyPr wrap="square" rtlCol="0">
+              <a:spAutoFit/>
+            </a:bodyPr>
+            <a:lstStyle/>
+            <a:p>
+              <a:r>
+                <a:rPr lang="en-US" sz="4000" dirty="0" err="1" smtClean="0">
+                  <a:solidFill>
+                    <a:srgbClr val="FF0000"/>
+                  </a:solidFill>
+                  <a:latin typeface="Times New Roman"/>
+                  <a:cs typeface="Times New Roman"/>
+                </a:rPr>
+                <a:t>F</a:t>
+              </a:r>
+              <a:r>
+                <a:rPr lang="en-US" sz="4000" baseline="-25000" dirty="0" err="1" smtClean="0">
+                  <a:solidFill>
+                    <a:srgbClr val="FF0000"/>
+                  </a:solidFill>
+                  <a:latin typeface="Times New Roman"/>
+                  <a:cs typeface="Times New Roman"/>
+                </a:rPr>
+                <a:t>f</a:t>
+              </a:r>
+              <a:endParaRPr lang="en-US" sz="4000" dirty="0">
                 <a:solidFill>
                   <a:srgbClr val="FF0000"/>
                 </a:solidFill>
-              </a:rPr>
-              <a:t>F</a:t>
-            </a:r>
-            <a:r>
-              <a:rPr lang="en-US" sz="4000" baseline="-25000" dirty="0" err="1" smtClean="0">
-                <a:solidFill>
-                  <a:srgbClr val="FF0000"/>
-                </a:solidFill>
-              </a:rPr>
-              <a:t>f</a:t>
-            </a:r>
-            <a:endParaRPr lang="en-US" sz="4000" dirty="0">
-              <a:solidFill>
-                <a:srgbClr val="FF0000"/>
-              </a:solidFill>
-            </a:endParaRPr>
-          </a:p>
-        </p:txBody>
-      </p:sp>
-      <p:sp>
-        <p:nvSpPr>
-          <p:cNvPr id="20" name="TextBox 19"/>
-          <p:cNvSpPr txBox="1"/>
-          <p:nvPr/>
-        </p:nvSpPr>
-        <p:spPr>
-          <a:xfrm>
-            <a:off x="4968896" y="2346987"/>
-            <a:ext cx="1298923" cy="523220"/>
-          </a:xfrm>
-          <a:prstGeom prst="rect">
-            <a:avLst/>
-          </a:prstGeom>
-          <a:noFill/>
-        </p:spPr>
-        <p:txBody>
-          <a:bodyPr wrap="square" rtlCol="0">
-            <a:spAutoFit/>
-          </a:bodyPr>
-          <a:lstStyle/>
-          <a:p>
-            <a:r>
-              <a:rPr lang="en-US" sz="2800" dirty="0" err="1" smtClean="0">
+                <a:latin typeface="Times New Roman"/>
+                <a:cs typeface="Times New Roman"/>
+              </a:endParaRPr>
+            </a:p>
+          </p:txBody>
+        </p:sp>
+        <p:sp>
+          <p:nvSpPr>
+            <p:cNvPr id="20" name="TextBox 19"/>
+            <p:cNvSpPr txBox="1"/>
+            <p:nvPr/>
+          </p:nvSpPr>
+          <p:spPr>
+            <a:xfrm>
+              <a:off x="4968896" y="3187723"/>
+              <a:ext cx="1298923" cy="523220"/>
+            </a:xfrm>
+            <a:prstGeom prst="rect">
+              <a:avLst/>
+            </a:prstGeom>
+            <a:noFill/>
+          </p:spPr>
+          <p:txBody>
+            <a:bodyPr wrap="square" rtlCol="0">
+              <a:spAutoFit/>
+            </a:bodyPr>
+            <a:lstStyle/>
+            <a:p>
+              <a:r>
+                <a:rPr lang="en-US" sz="2800" dirty="0" err="1" smtClean="0">
+                  <a:solidFill>
+                    <a:srgbClr val="000000"/>
+                  </a:solidFill>
+                  <a:latin typeface="Times New Roman"/>
+                  <a:cs typeface="Times New Roman"/>
+                </a:rPr>
+                <a:t>Fsinθ</a:t>
+              </a:r>
+              <a:endParaRPr lang="en-US" sz="2800" dirty="0" smtClean="0">
                 <a:solidFill>
                   <a:srgbClr val="000000"/>
                 </a:solidFill>
-              </a:rPr>
-              <a:t>Fsinθ</a:t>
-            </a:r>
-            <a:endParaRPr lang="en-US" sz="2800" dirty="0" smtClean="0">
-              <a:solidFill>
-                <a:srgbClr val="000000"/>
-              </a:solidFill>
-            </a:endParaRPr>
-          </a:p>
-        </p:txBody>
-      </p:sp>
-      <p:sp>
-        <p:nvSpPr>
-          <p:cNvPr id="21" name="TextBox 20"/>
-          <p:cNvSpPr txBox="1"/>
-          <p:nvPr/>
-        </p:nvSpPr>
-        <p:spPr>
-          <a:xfrm>
-            <a:off x="3152463" y="2909651"/>
-            <a:ext cx="1084499" cy="523220"/>
-          </a:xfrm>
-          <a:prstGeom prst="rect">
-            <a:avLst/>
-          </a:prstGeom>
-          <a:noFill/>
-        </p:spPr>
-        <p:txBody>
-          <a:bodyPr wrap="square" rtlCol="0">
-            <a:spAutoFit/>
-          </a:bodyPr>
-          <a:lstStyle/>
-          <a:p>
-            <a:r>
-              <a:rPr lang="en-US" sz="2800" dirty="0" err="1" smtClean="0">
+                <a:latin typeface="Times New Roman"/>
+                <a:cs typeface="Times New Roman"/>
+              </a:endParaRPr>
+            </a:p>
+          </p:txBody>
+        </p:sp>
+        <p:sp>
+          <p:nvSpPr>
+            <p:cNvPr id="21" name="TextBox 20"/>
+            <p:cNvSpPr txBox="1"/>
+            <p:nvPr/>
+          </p:nvSpPr>
+          <p:spPr>
+            <a:xfrm>
+              <a:off x="3152463" y="3750387"/>
+              <a:ext cx="1084499" cy="523220"/>
+            </a:xfrm>
+            <a:prstGeom prst="rect">
+              <a:avLst/>
+            </a:prstGeom>
+            <a:noFill/>
+          </p:spPr>
+          <p:txBody>
+            <a:bodyPr wrap="square" rtlCol="0">
+              <a:spAutoFit/>
+            </a:bodyPr>
+            <a:lstStyle/>
+            <a:p>
+              <a:r>
+                <a:rPr lang="en-US" sz="2800" dirty="0" err="1" smtClean="0">
+                  <a:solidFill>
+                    <a:srgbClr val="000000"/>
+                  </a:solidFill>
+                  <a:latin typeface="Times New Roman"/>
+                  <a:cs typeface="Times New Roman"/>
+                </a:rPr>
+                <a:t>Fcosθ</a:t>
+              </a:r>
+              <a:endParaRPr lang="en-US" sz="2800" dirty="0" smtClean="0">
                 <a:solidFill>
                   <a:srgbClr val="000000"/>
                 </a:solidFill>
-              </a:rPr>
-              <a:t>Fcosθ</a:t>
-            </a:r>
-            <a:endParaRPr lang="en-US" sz="2800" dirty="0" smtClean="0">
+                <a:latin typeface="Times New Roman"/>
+                <a:cs typeface="Times New Roman"/>
+              </a:endParaRPr>
+            </a:p>
+          </p:txBody>
+        </p:sp>
+        <p:sp>
+          <p:nvSpPr>
+            <p:cNvPr id="22" name="Freeform 21"/>
+            <p:cNvSpPr/>
+            <p:nvPr/>
+          </p:nvSpPr>
+          <p:spPr>
+            <a:xfrm>
+              <a:off x="4272011" y="3793429"/>
+              <a:ext cx="247428" cy="148459"/>
+            </a:xfrm>
+            <a:custGeom>
+              <a:avLst/>
+              <a:gdLst>
+                <a:gd name="connsiteX0" fmla="*/ 0 w 247428"/>
+                <a:gd name="connsiteY0" fmla="*/ 131964 h 148459"/>
+                <a:gd name="connsiteX1" fmla="*/ 82471 w 247428"/>
+                <a:gd name="connsiteY1" fmla="*/ 148459 h 148459"/>
+                <a:gd name="connsiteX2" fmla="*/ 214425 w 247428"/>
+                <a:gd name="connsiteY2" fmla="*/ 115468 h 148459"/>
+                <a:gd name="connsiteX3" fmla="*/ 247414 w 247428"/>
+                <a:gd name="connsiteY3" fmla="*/ 0 h 148459"/>
+              </a:gdLst>
+              <a:ahLst/>
+              <a:cxnLst>
+                <a:cxn ang="0">
+                  <a:pos x="connsiteX0" y="connsiteY0"/>
+                </a:cxn>
+                <a:cxn ang="0">
+                  <a:pos x="connsiteX1" y="connsiteY1"/>
+                </a:cxn>
+                <a:cxn ang="0">
+                  <a:pos x="connsiteX2" y="connsiteY2"/>
+                </a:cxn>
+                <a:cxn ang="0">
+                  <a:pos x="connsiteX3" y="connsiteY3"/>
+                </a:cxn>
+              </a:cxnLst>
+              <a:rect l="l" t="t" r="r" b="b"/>
+              <a:pathLst>
+                <a:path w="247428" h="148459">
+                  <a:moveTo>
+                    <a:pt x="0" y="131964"/>
+                  </a:moveTo>
+                  <a:cubicBezTo>
+                    <a:pt x="27490" y="137462"/>
+                    <a:pt x="54436" y="148459"/>
+                    <a:pt x="82471" y="148459"/>
+                  </a:cubicBezTo>
+                  <a:cubicBezTo>
+                    <a:pt x="122282" y="148459"/>
+                    <a:pt x="175377" y="128485"/>
+                    <a:pt x="214425" y="115468"/>
+                  </a:cubicBezTo>
+                  <a:cubicBezTo>
+                    <a:pt x="249153" y="11279"/>
+                    <a:pt x="247414" y="51270"/>
+                    <a:pt x="247414" y="0"/>
+                  </a:cubicBezTo>
+                </a:path>
+              </a:pathLst>
+            </a:custGeom>
+            <a:ln w="76200" cmpd="sng">
               <a:solidFill>
-                <a:srgbClr val="000000"/>
+                <a:schemeClr val="tx1"/>
               </a:solidFill>
-            </a:endParaRPr>
-          </a:p>
-        </p:txBody>
-      </p:sp>
-      <p:sp>
-        <p:nvSpPr>
-          <p:cNvPr id="22" name="Freeform 21"/>
-          <p:cNvSpPr/>
-          <p:nvPr/>
-        </p:nvSpPr>
-        <p:spPr>
-          <a:xfrm>
-            <a:off x="4272011" y="2952693"/>
-            <a:ext cx="247428" cy="148459"/>
-          </a:xfrm>
-          <a:custGeom>
-            <a:avLst/>
-            <a:gdLst>
-              <a:gd name="connsiteX0" fmla="*/ 0 w 247428"/>
-              <a:gd name="connsiteY0" fmla="*/ 131964 h 148459"/>
-              <a:gd name="connsiteX1" fmla="*/ 82471 w 247428"/>
-              <a:gd name="connsiteY1" fmla="*/ 148459 h 148459"/>
-              <a:gd name="connsiteX2" fmla="*/ 214425 w 247428"/>
-              <a:gd name="connsiteY2" fmla="*/ 115468 h 148459"/>
-              <a:gd name="connsiteX3" fmla="*/ 247414 w 247428"/>
-              <a:gd name="connsiteY3" fmla="*/ 0 h 148459"/>
-            </a:gdLst>
-            <a:ahLst/>
-            <a:cxnLst>
-              <a:cxn ang="0">
-                <a:pos x="connsiteX0" y="connsiteY0"/>
-              </a:cxn>
-              <a:cxn ang="0">
-                <a:pos x="connsiteX1" y="connsiteY1"/>
-              </a:cxn>
-              <a:cxn ang="0">
-                <a:pos x="connsiteX2" y="connsiteY2"/>
-              </a:cxn>
-              <a:cxn ang="0">
-                <a:pos x="connsiteX3" y="connsiteY3"/>
-              </a:cxn>
-            </a:cxnLst>
-            <a:rect l="l" t="t" r="r" b="b"/>
-            <a:pathLst>
-              <a:path w="247428" h="148459">
-                <a:moveTo>
-                  <a:pt x="0" y="131964"/>
-                </a:moveTo>
-                <a:cubicBezTo>
-                  <a:pt x="27490" y="137462"/>
-                  <a:pt x="54436" y="148459"/>
-                  <a:pt x="82471" y="148459"/>
-                </a:cubicBezTo>
-                <a:cubicBezTo>
-                  <a:pt x="122282" y="148459"/>
-                  <a:pt x="175377" y="128485"/>
-                  <a:pt x="214425" y="115468"/>
-                </a:cubicBezTo>
-                <a:cubicBezTo>
-                  <a:pt x="249153" y="11279"/>
-                  <a:pt x="247414" y="51270"/>
-                  <a:pt x="247414" y="0"/>
-                </a:cubicBezTo>
-              </a:path>
-            </a:pathLst>
-          </a:custGeom>
-          <a:ln w="76200" cmpd="sng">
-            <a:solidFill>
+            </a:ln>
+          </p:spPr>
+          <p:style>
+            <a:lnRef idx="2">
+              <a:schemeClr val="accent1"/>
+            </a:lnRef>
+            <a:fillRef idx="0">
+              <a:schemeClr val="accent1"/>
+            </a:fillRef>
+            <a:effectRef idx="1">
+              <a:schemeClr val="accent1"/>
+            </a:effectRef>
+            <a:fontRef idx="minor">
               <a:schemeClr val="tx1"/>
-            </a:solidFill>
-          </a:ln>
-        </p:spPr>
-        <p:style>
-          <a:lnRef idx="2">
-            <a:schemeClr val="accent1"/>
-          </a:lnRef>
-          <a:fillRef idx="0">
-            <a:schemeClr val="accent1"/>
-          </a:fillRef>
-          <a:effectRef idx="1">
-            <a:schemeClr val="accent1"/>
-          </a:effectRef>
-          <a:fontRef idx="minor">
-            <a:schemeClr val="tx1"/>
-          </a:fontRef>
-        </p:style>
-        <p:txBody>
-          <a:bodyPr rtlCol="0" anchor="ctr"/>
-          <a:lstStyle/>
-          <a:p>
-            <a:pPr algn="ctr"/>
-            <a:endParaRPr lang="en-US"/>
-          </a:p>
-        </p:txBody>
-      </p:sp>
-      <p:sp>
-        <p:nvSpPr>
-          <p:cNvPr id="23" name="TextBox 22"/>
-          <p:cNvSpPr txBox="1"/>
-          <p:nvPr/>
-        </p:nvSpPr>
-        <p:spPr>
-          <a:xfrm>
-            <a:off x="4519439" y="2973816"/>
-            <a:ext cx="649462" cy="523220"/>
-          </a:xfrm>
-          <a:prstGeom prst="rect">
-            <a:avLst/>
-          </a:prstGeom>
-          <a:noFill/>
-        </p:spPr>
-        <p:txBody>
-          <a:bodyPr wrap="square" rtlCol="0">
-            <a:spAutoFit/>
-          </a:bodyPr>
-          <a:lstStyle/>
-          <a:p>
-            <a:r>
-              <a:rPr lang="en-US" sz="2800" dirty="0" err="1" smtClean="0">
+            </a:fontRef>
+          </p:style>
+          <p:txBody>
+            <a:bodyPr rtlCol="0" anchor="ctr"/>
+            <a:lstStyle/>
+            <a:p>
+              <a:pPr algn="ctr"/>
+              <a:endParaRPr lang="en-US">
+                <a:latin typeface="Times New Roman"/>
+                <a:cs typeface="Times New Roman"/>
+              </a:endParaRPr>
+            </a:p>
+          </p:txBody>
+        </p:sp>
+        <p:sp>
+          <p:nvSpPr>
+            <p:cNvPr id="23" name="TextBox 22"/>
+            <p:cNvSpPr txBox="1"/>
+            <p:nvPr/>
+          </p:nvSpPr>
+          <p:spPr>
+            <a:xfrm>
+              <a:off x="4519439" y="3814552"/>
+              <a:ext cx="649462" cy="523220"/>
+            </a:xfrm>
+            <a:prstGeom prst="rect">
+              <a:avLst/>
+            </a:prstGeom>
+            <a:noFill/>
+          </p:spPr>
+          <p:txBody>
+            <a:bodyPr wrap="square" rtlCol="0">
+              <a:spAutoFit/>
+            </a:bodyPr>
+            <a:lstStyle/>
+            <a:p>
+              <a:r>
+                <a:rPr lang="en-US" sz="2800" dirty="0" err="1" smtClean="0">
+                  <a:solidFill>
+                    <a:srgbClr val="000000"/>
+                  </a:solidFill>
+                  <a:latin typeface="Times New Roman"/>
+                  <a:cs typeface="Times New Roman"/>
+                </a:rPr>
+                <a:t>θ</a:t>
+              </a:r>
+              <a:endParaRPr lang="en-US" sz="2800" dirty="0" smtClean="0">
                 <a:solidFill>
                   <a:srgbClr val="000000"/>
                 </a:solidFill>
-              </a:rPr>
-              <a:t>θ</a:t>
-            </a:r>
-            <a:endParaRPr lang="en-US" sz="2800" dirty="0" smtClean="0">
-              <a:solidFill>
-                <a:srgbClr val="000000"/>
-              </a:solidFill>
-            </a:endParaRPr>
-          </a:p>
-        </p:txBody>
-      </p:sp>
-      <p:sp>
-        <p:nvSpPr>
-          <p:cNvPr id="24" name="TextBox 23"/>
-          <p:cNvSpPr txBox="1"/>
-          <p:nvPr/>
-        </p:nvSpPr>
-        <p:spPr>
-          <a:xfrm>
-            <a:off x="6195652" y="2872736"/>
-            <a:ext cx="468025" cy="707886"/>
-          </a:xfrm>
-          <a:prstGeom prst="rect">
-            <a:avLst/>
-          </a:prstGeom>
-          <a:noFill/>
-        </p:spPr>
-        <p:txBody>
-          <a:bodyPr wrap="square" rtlCol="0">
-            <a:spAutoFit/>
-          </a:bodyPr>
-          <a:lstStyle/>
-          <a:p>
-            <a:r>
-              <a:rPr lang="en-US" sz="4000" dirty="0" smtClean="0">
+                <a:latin typeface="Times New Roman"/>
+                <a:cs typeface="Times New Roman"/>
+              </a:endParaRPr>
+            </a:p>
+          </p:txBody>
+        </p:sp>
+        <p:sp>
+          <p:nvSpPr>
+            <p:cNvPr id="24" name="TextBox 23"/>
+            <p:cNvSpPr txBox="1"/>
+            <p:nvPr/>
+          </p:nvSpPr>
+          <p:spPr>
+            <a:xfrm>
+              <a:off x="6195652" y="3713472"/>
+              <a:ext cx="468025" cy="707886"/>
+            </a:xfrm>
+            <a:prstGeom prst="rect">
+              <a:avLst/>
+            </a:prstGeom>
+            <a:noFill/>
+          </p:spPr>
+          <p:txBody>
+            <a:bodyPr wrap="square" rtlCol="0">
+              <a:spAutoFit/>
+            </a:bodyPr>
+            <a:lstStyle/>
+            <a:p>
+              <a:r>
+                <a:rPr lang="en-US" sz="4000" dirty="0" smtClean="0">
+                  <a:solidFill>
+                    <a:srgbClr val="000000"/>
+                  </a:solidFill>
+                  <a:latin typeface="Times New Roman"/>
+                  <a:cs typeface="Times New Roman"/>
+                </a:rPr>
+                <a:t>F</a:t>
+              </a:r>
+              <a:endParaRPr lang="en-US" sz="4000" dirty="0">
                 <a:solidFill>
                   <a:srgbClr val="000000"/>
                 </a:solidFill>
-              </a:rPr>
-              <a:t>F</a:t>
-            </a:r>
-            <a:endParaRPr lang="en-US" sz="4000" dirty="0">
+                <a:latin typeface="Times New Roman"/>
+                <a:cs typeface="Times New Roman"/>
+              </a:endParaRPr>
+            </a:p>
+          </p:txBody>
+        </p:sp>
+        <p:sp>
+          <p:nvSpPr>
+            <p:cNvPr id="25" name="Oval 24"/>
+            <p:cNvSpPr/>
+            <p:nvPr/>
+          </p:nvSpPr>
+          <p:spPr>
+            <a:xfrm>
+              <a:off x="2436848" y="1113101"/>
+              <a:ext cx="1187585" cy="1187675"/>
+            </a:xfrm>
+            <a:prstGeom prst="ellipse">
+              <a:avLst/>
+            </a:prstGeom>
+            <a:solidFill>
+              <a:schemeClr val="tx2"/>
+            </a:solidFill>
+            <a:ln>
+              <a:noFill/>
+            </a:ln>
+          </p:spPr>
+          <p:style>
+            <a:lnRef idx="1">
+              <a:schemeClr val="accent1"/>
+            </a:lnRef>
+            <a:fillRef idx="3">
+              <a:schemeClr val="accent1"/>
+            </a:fillRef>
+            <a:effectRef idx="2">
+              <a:schemeClr val="accent1"/>
+            </a:effectRef>
+            <a:fontRef idx="minor">
+              <a:schemeClr val="lt1"/>
+            </a:fontRef>
+          </p:style>
+          <p:txBody>
+            <a:bodyPr rtlCol="0" anchor="ctr"/>
+            <a:lstStyle/>
+            <a:p>
+              <a:pPr algn="ctr"/>
+              <a:endParaRPr lang="en-US">
+                <a:latin typeface="Times New Roman"/>
+                <a:cs typeface="Times New Roman"/>
+              </a:endParaRPr>
+            </a:p>
+          </p:txBody>
+        </p:sp>
+        <p:cxnSp>
+          <p:nvCxnSpPr>
+            <p:cNvPr id="26" name="Straight Arrow Connector 25"/>
+            <p:cNvCxnSpPr/>
+            <p:nvPr/>
+          </p:nvCxnSpPr>
+          <p:spPr>
+            <a:xfrm>
+              <a:off x="3030644" y="1673940"/>
+              <a:ext cx="1979310" cy="659820"/>
+            </a:xfrm>
+            <a:prstGeom prst="straightConnector1">
+              <a:avLst/>
+            </a:prstGeom>
+            <a:ln w="57150" cmpd="sng">
               <a:solidFill>
-                <a:srgbClr val="000000"/>
+                <a:schemeClr val="tx1"/>
               </a:solidFill>
-            </a:endParaRPr>
-          </a:p>
-        </p:txBody>
-      </p:sp>
+              <a:tailEnd type="arrow"/>
+            </a:ln>
+          </p:spPr>
+          <p:style>
+            <a:lnRef idx="2">
+              <a:schemeClr val="accent1"/>
+            </a:lnRef>
+            <a:fillRef idx="0">
+              <a:schemeClr val="accent1"/>
+            </a:fillRef>
+            <a:effectRef idx="1">
+              <a:schemeClr val="accent1"/>
+            </a:effectRef>
+            <a:fontRef idx="minor">
+              <a:schemeClr val="tx1"/>
+            </a:fontRef>
+          </p:style>
+        </p:cxnSp>
+        <p:sp>
+          <p:nvSpPr>
+            <p:cNvPr id="27" name="TextBox 26"/>
+            <p:cNvSpPr txBox="1"/>
+            <p:nvPr/>
+          </p:nvSpPr>
+          <p:spPr>
+            <a:xfrm>
+              <a:off x="4952944" y="1737200"/>
+              <a:ext cx="468025" cy="707886"/>
+            </a:xfrm>
+            <a:prstGeom prst="rect">
+              <a:avLst/>
+            </a:prstGeom>
+            <a:noFill/>
+          </p:spPr>
+          <p:txBody>
+            <a:bodyPr wrap="square" rtlCol="0">
+              <a:spAutoFit/>
+            </a:bodyPr>
+            <a:lstStyle/>
+            <a:p>
+              <a:r>
+                <a:rPr lang="en-US" sz="4000" dirty="0" smtClean="0">
+                  <a:solidFill>
+                    <a:srgbClr val="000000"/>
+                  </a:solidFill>
+                  <a:latin typeface="Times New Roman"/>
+                  <a:cs typeface="Times New Roman"/>
+                </a:rPr>
+                <a:t>F</a:t>
+              </a:r>
+              <a:endParaRPr lang="en-US" sz="4000" dirty="0">
+                <a:solidFill>
+                  <a:srgbClr val="000000"/>
+                </a:solidFill>
+                <a:latin typeface="Times New Roman"/>
+                <a:cs typeface="Times New Roman"/>
+              </a:endParaRPr>
+            </a:p>
+          </p:txBody>
+        </p:sp>
+      </p:grpSp>
     </p:spTree>
     <p:extLst>
       <p:ext uri="{BB962C8B-B14F-4D97-AF65-F5344CB8AC3E}">
@@ -6261,10 +6441,6 @@
               </a:rPr>
               <a:t> B</a:t>
             </a:r>
-            <a:endParaRPr lang="en-US" sz="1700" dirty="0" smtClean="0">
-              <a:latin typeface="Arial"/>
-              <a:cs typeface="Arial"/>
-            </a:endParaRPr>
           </a:p>
           <a:p>
             <a:r>
@@ -10243,7 +10419,6 @@
               <a:rPr lang="en-US" sz="3800" dirty="0"/>
               <a:t>B</a:t>
             </a:r>
-            <a:endParaRPr lang="en-US" sz="3800" dirty="0"/>
           </a:p>
         </p:txBody>
       </p:sp>
@@ -11295,6 +11470,3055 @@
       </p:par>
     </p:tnLst>
   </p:timing>
+</p:sld>
+</file>
+
+<file path=ppt/slides/slide3.xml><?xml version="1.0" encoding="utf-8"?>
+<p:sld xmlns:a="http://schemas.openxmlformats.org/drawingml/2006/main" xmlns:r="http://schemas.openxmlformats.org/officeDocument/2006/relationships" xmlns:p="http://schemas.openxmlformats.org/presentationml/2006/main">
+  <p:cSld>
+    <p:spTree>
+      <p:nvGrpSpPr>
+        <p:cNvPr id="1" name=""/>
+        <p:cNvGrpSpPr/>
+        <p:nvPr/>
+      </p:nvGrpSpPr>
+      <p:grpSpPr>
+        <a:xfrm>
+          <a:off x="0" y="0"/>
+          <a:ext cx="0" cy="0"/>
+          <a:chOff x="0" y="0"/>
+          <a:chExt cx="0" cy="0"/>
+        </a:xfrm>
+      </p:grpSpPr>
+      <p:pic>
+        <p:nvPicPr>
+          <p:cNvPr id="4" name="Picture 3" descr="CovControl2Try.eps"/>
+          <p:cNvPicPr>
+            <a:picLocks noChangeAspect="1"/>
+          </p:cNvPicPr>
+          <p:nvPr/>
+        </p:nvPicPr>
+        <p:blipFill>
+          <a:blip r:embed="rId2">
+            <a:extLst>
+              <a:ext uri="{28A0092B-C50C-407E-A947-70E740481C1C}">
+                <a14:useLocalDpi xmlns:a14="http://schemas.microsoft.com/office/drawing/2010/main" val="0"/>
+              </a:ext>
+            </a:extLst>
+          </a:blip>
+          <a:stretch>
+            <a:fillRect/>
+          </a:stretch>
+        </p:blipFill>
+        <p:spPr>
+          <a:xfrm>
+            <a:off x="-307334" y="1806738"/>
+            <a:ext cx="10273468" cy="5277106"/>
+          </a:xfrm>
+          <a:prstGeom prst="rect">
+            <a:avLst/>
+          </a:prstGeom>
+        </p:spPr>
+      </p:pic>
+    </p:spTree>
+    <p:extLst>
+      <p:ext uri="{BB962C8B-B14F-4D97-AF65-F5344CB8AC3E}">
+        <p14:creationId xmlns:p14="http://schemas.microsoft.com/office/powerpoint/2010/main" val="4041359197"/>
+      </p:ext>
+    </p:extLst>
+  </p:cSld>
+  <p:clrMapOvr>
+    <a:masterClrMapping/>
+  </p:clrMapOvr>
+</p:sld>
+</file>
+
+<file path=ppt/slides/slide4.xml><?xml version="1.0" encoding="utf-8"?>
+<p:sld xmlns:a="http://schemas.openxmlformats.org/drawingml/2006/main" xmlns:r="http://schemas.openxmlformats.org/officeDocument/2006/relationships" xmlns:p="http://schemas.openxmlformats.org/presentationml/2006/main">
+  <p:cSld>
+    <p:spTree>
+      <p:nvGrpSpPr>
+        <p:cNvPr id="1" name=""/>
+        <p:cNvGrpSpPr/>
+        <p:nvPr/>
+      </p:nvGrpSpPr>
+      <p:grpSpPr>
+        <a:xfrm>
+          <a:off x="0" y="0"/>
+          <a:ext cx="0" cy="0"/>
+          <a:chOff x="0" y="0"/>
+          <a:chExt cx="0" cy="0"/>
+        </a:xfrm>
+      </p:grpSpPr>
+      <p:pic>
+        <p:nvPicPr>
+          <p:cNvPr id="4" name="Picture 3" descr="twoR_5.jpg"/>
+          <p:cNvPicPr>
+            <a:picLocks noChangeAspect="1"/>
+          </p:cNvPicPr>
+          <p:nvPr/>
+        </p:nvPicPr>
+        <p:blipFill>
+          <a:blip r:embed="rId2">
+            <a:extLst>
+              <a:ext uri="{28A0092B-C50C-407E-A947-70E740481C1C}">
+                <a14:useLocalDpi xmlns:a14="http://schemas.microsoft.com/office/drawing/2010/main" val="0"/>
+              </a:ext>
+            </a:extLst>
+          </a:blip>
+          <a:stretch>
+            <a:fillRect/>
+          </a:stretch>
+        </p:blipFill>
+        <p:spPr>
+          <a:xfrm>
+            <a:off x="0" y="0"/>
+            <a:ext cx="8712531" cy="6858000"/>
+          </a:xfrm>
+          <a:prstGeom prst="rect">
+            <a:avLst/>
+          </a:prstGeom>
+        </p:spPr>
+      </p:pic>
+      <p:sp>
+        <p:nvSpPr>
+          <p:cNvPr id="6" name="Oval 5"/>
+          <p:cNvSpPr/>
+          <p:nvPr/>
+        </p:nvSpPr>
+        <p:spPr>
+          <a:xfrm>
+            <a:off x="5196145" y="2692551"/>
+            <a:ext cx="455694" cy="491602"/>
+          </a:xfrm>
+          <a:prstGeom prst="ellipse">
+            <a:avLst/>
+          </a:prstGeom>
+          <a:noFill/>
+          <a:ln w="76200" cmpd="sng">
+            <a:solidFill>
+              <a:srgbClr val="008000"/>
+            </a:solidFill>
+          </a:ln>
+        </p:spPr>
+        <p:style>
+          <a:lnRef idx="1">
+            <a:schemeClr val="accent1"/>
+          </a:lnRef>
+          <a:fillRef idx="3">
+            <a:schemeClr val="accent1"/>
+          </a:fillRef>
+          <a:effectRef idx="2">
+            <a:schemeClr val="accent1"/>
+          </a:effectRef>
+          <a:fontRef idx="minor">
+            <a:schemeClr val="lt1"/>
+          </a:fontRef>
+        </p:style>
+        <p:txBody>
+          <a:bodyPr rtlCol="0" anchor="ctr"/>
+          <a:lstStyle/>
+          <a:p>
+            <a:pPr algn="ctr"/>
+            <a:endParaRPr lang="en-US"/>
+          </a:p>
+        </p:txBody>
+      </p:sp>
+      <p:sp>
+        <p:nvSpPr>
+          <p:cNvPr id="7" name="Oval 6"/>
+          <p:cNvSpPr/>
+          <p:nvPr/>
+        </p:nvSpPr>
+        <p:spPr>
+          <a:xfrm>
+            <a:off x="4381963" y="1905457"/>
+            <a:ext cx="455694" cy="491602"/>
+          </a:xfrm>
+          <a:prstGeom prst="ellipse">
+            <a:avLst/>
+          </a:prstGeom>
+          <a:noFill/>
+          <a:ln w="76200" cmpd="sng">
+            <a:solidFill>
+              <a:srgbClr val="008000"/>
+            </a:solidFill>
+          </a:ln>
+        </p:spPr>
+        <p:style>
+          <a:lnRef idx="1">
+            <a:schemeClr val="accent1"/>
+          </a:lnRef>
+          <a:fillRef idx="3">
+            <a:schemeClr val="accent1"/>
+          </a:fillRef>
+          <a:effectRef idx="2">
+            <a:schemeClr val="accent1"/>
+          </a:effectRef>
+          <a:fontRef idx="minor">
+            <a:schemeClr val="lt1"/>
+          </a:fontRef>
+        </p:style>
+        <p:txBody>
+          <a:bodyPr rtlCol="0" anchor="ctr"/>
+          <a:lstStyle/>
+          <a:p>
+            <a:pPr algn="ctr"/>
+            <a:endParaRPr lang="en-US"/>
+          </a:p>
+        </p:txBody>
+      </p:sp>
+    </p:spTree>
+    <p:extLst>
+      <p:ext uri="{BB962C8B-B14F-4D97-AF65-F5344CB8AC3E}">
+        <p14:creationId xmlns:p14="http://schemas.microsoft.com/office/powerpoint/2010/main" val="3193148463"/>
+      </p:ext>
+    </p:extLst>
+  </p:cSld>
+  <p:clrMapOvr>
+    <a:masterClrMapping/>
+  </p:clrMapOvr>
+</p:sld>
+</file>
+
+<file path=ppt/slides/slide5.xml><?xml version="1.0" encoding="utf-8"?>
+<p:sld xmlns:a="http://schemas.openxmlformats.org/drawingml/2006/main" xmlns:r="http://schemas.openxmlformats.org/officeDocument/2006/relationships" xmlns:p="http://schemas.openxmlformats.org/presentationml/2006/main">
+  <p:cSld>
+    <p:spTree>
+      <p:nvGrpSpPr>
+        <p:cNvPr id="1" name=""/>
+        <p:cNvGrpSpPr/>
+        <p:nvPr/>
+      </p:nvGrpSpPr>
+      <p:grpSpPr>
+        <a:xfrm>
+          <a:off x="0" y="0"/>
+          <a:ext cx="0" cy="0"/>
+          <a:chOff x="0" y="0"/>
+          <a:chExt cx="0" cy="0"/>
+        </a:xfrm>
+      </p:grpSpPr>
+      <p:pic>
+        <p:nvPicPr>
+          <p:cNvPr id="4" name="Picture 3" descr="twoR_1.jpg"/>
+          <p:cNvPicPr>
+            <a:picLocks noChangeAspect="1"/>
+          </p:cNvPicPr>
+          <p:nvPr/>
+        </p:nvPicPr>
+        <p:blipFill>
+          <a:blip r:embed="rId2">
+            <a:extLst>
+              <a:ext uri="{28A0092B-C50C-407E-A947-70E740481C1C}">
+                <a14:useLocalDpi xmlns:a14="http://schemas.microsoft.com/office/drawing/2010/main" val="0"/>
+              </a:ext>
+            </a:extLst>
+          </a:blip>
+          <a:stretch>
+            <a:fillRect/>
+          </a:stretch>
+        </p:blipFill>
+        <p:spPr>
+          <a:xfrm>
+            <a:off x="0" y="0"/>
+            <a:ext cx="8759040" cy="6858000"/>
+          </a:xfrm>
+          <a:prstGeom prst="rect">
+            <a:avLst/>
+          </a:prstGeom>
+        </p:spPr>
+      </p:pic>
+      <p:sp>
+        <p:nvSpPr>
+          <p:cNvPr id="5" name="Oval 4"/>
+          <p:cNvSpPr/>
+          <p:nvPr/>
+        </p:nvSpPr>
+        <p:spPr>
+          <a:xfrm>
+            <a:off x="5196145" y="2692551"/>
+            <a:ext cx="455694" cy="491602"/>
+          </a:xfrm>
+          <a:prstGeom prst="ellipse">
+            <a:avLst/>
+          </a:prstGeom>
+          <a:noFill/>
+          <a:ln w="76200" cmpd="sng">
+            <a:solidFill>
+              <a:srgbClr val="008000"/>
+            </a:solidFill>
+          </a:ln>
+        </p:spPr>
+        <p:style>
+          <a:lnRef idx="1">
+            <a:schemeClr val="accent1"/>
+          </a:lnRef>
+          <a:fillRef idx="3">
+            <a:schemeClr val="accent1"/>
+          </a:fillRef>
+          <a:effectRef idx="2">
+            <a:schemeClr val="accent1"/>
+          </a:effectRef>
+          <a:fontRef idx="minor">
+            <a:schemeClr val="lt1"/>
+          </a:fontRef>
+        </p:style>
+        <p:txBody>
+          <a:bodyPr rtlCol="0" anchor="ctr"/>
+          <a:lstStyle/>
+          <a:p>
+            <a:pPr algn="ctr"/>
+            <a:endParaRPr lang="en-US"/>
+          </a:p>
+        </p:txBody>
+      </p:sp>
+      <p:sp>
+        <p:nvSpPr>
+          <p:cNvPr id="6" name="Oval 5"/>
+          <p:cNvSpPr/>
+          <p:nvPr/>
+        </p:nvSpPr>
+        <p:spPr>
+          <a:xfrm>
+            <a:off x="4381963" y="1905457"/>
+            <a:ext cx="455694" cy="491602"/>
+          </a:xfrm>
+          <a:prstGeom prst="ellipse">
+            <a:avLst/>
+          </a:prstGeom>
+          <a:noFill/>
+          <a:ln w="76200" cmpd="sng">
+            <a:solidFill>
+              <a:srgbClr val="008000"/>
+            </a:solidFill>
+          </a:ln>
+        </p:spPr>
+        <p:style>
+          <a:lnRef idx="1">
+            <a:schemeClr val="accent1"/>
+          </a:lnRef>
+          <a:fillRef idx="3">
+            <a:schemeClr val="accent1"/>
+          </a:fillRef>
+          <a:effectRef idx="2">
+            <a:schemeClr val="accent1"/>
+          </a:effectRef>
+          <a:fontRef idx="minor">
+            <a:schemeClr val="lt1"/>
+          </a:fontRef>
+        </p:style>
+        <p:txBody>
+          <a:bodyPr rtlCol="0" anchor="ctr"/>
+          <a:lstStyle/>
+          <a:p>
+            <a:pPr algn="ctr"/>
+            <a:endParaRPr lang="en-US"/>
+          </a:p>
+        </p:txBody>
+      </p:sp>
+      <p:cxnSp>
+        <p:nvCxnSpPr>
+          <p:cNvPr id="13" name="Straight Arrow Connector 12"/>
+          <p:cNvCxnSpPr/>
+          <p:nvPr/>
+        </p:nvCxnSpPr>
+        <p:spPr>
+          <a:xfrm>
+            <a:off x="6814404" y="3345149"/>
+            <a:ext cx="1944636" cy="679761"/>
+          </a:xfrm>
+          <a:prstGeom prst="straightConnector1">
+            <a:avLst/>
+          </a:prstGeom>
+          <a:ln w="63500">
+            <a:solidFill>
+              <a:schemeClr val="tx2"/>
+            </a:solidFill>
+            <a:tailEnd type="stealth" w="lg" len="lg"/>
+          </a:ln>
+        </p:spPr>
+        <p:style>
+          <a:lnRef idx="2">
+            <a:schemeClr val="accent1"/>
+          </a:lnRef>
+          <a:fillRef idx="0">
+            <a:schemeClr val="accent1"/>
+          </a:fillRef>
+          <a:effectRef idx="1">
+            <a:schemeClr val="accent1"/>
+          </a:effectRef>
+          <a:fontRef idx="minor">
+            <a:schemeClr val="tx1"/>
+          </a:fontRef>
+        </p:style>
+      </p:cxnSp>
+      <p:cxnSp>
+        <p:nvCxnSpPr>
+          <p:cNvPr id="18" name="Straight Arrow Connector 17"/>
+          <p:cNvCxnSpPr/>
+          <p:nvPr/>
+        </p:nvCxnSpPr>
+        <p:spPr>
+          <a:xfrm>
+            <a:off x="4873429" y="4678182"/>
+            <a:ext cx="1944636" cy="679761"/>
+          </a:xfrm>
+          <a:prstGeom prst="straightConnector1">
+            <a:avLst/>
+          </a:prstGeom>
+          <a:ln w="63500">
+            <a:solidFill>
+              <a:srgbClr val="953735"/>
+            </a:solidFill>
+            <a:tailEnd type="stealth" w="lg" len="lg"/>
+          </a:ln>
+        </p:spPr>
+        <p:style>
+          <a:lnRef idx="2">
+            <a:schemeClr val="accent1"/>
+          </a:lnRef>
+          <a:fillRef idx="0">
+            <a:schemeClr val="accent1"/>
+          </a:fillRef>
+          <a:effectRef idx="1">
+            <a:schemeClr val="accent1"/>
+          </a:effectRef>
+          <a:fontRef idx="minor">
+            <a:schemeClr val="tx1"/>
+          </a:fontRef>
+        </p:style>
+      </p:cxnSp>
+      <p:sp>
+        <p:nvSpPr>
+          <p:cNvPr id="19" name="Donut 18"/>
+          <p:cNvSpPr/>
+          <p:nvPr/>
+        </p:nvSpPr>
+        <p:spPr>
+          <a:xfrm>
+            <a:off x="2507680" y="931990"/>
+            <a:ext cx="203199" cy="211666"/>
+          </a:xfrm>
+          <a:prstGeom prst="donut">
+            <a:avLst/>
+          </a:prstGeom>
+          <a:solidFill>
+            <a:srgbClr val="FF0000"/>
+          </a:solidFill>
+          <a:ln>
+            <a:noFill/>
+          </a:ln>
+        </p:spPr>
+        <p:style>
+          <a:lnRef idx="1">
+            <a:schemeClr val="accent1"/>
+          </a:lnRef>
+          <a:fillRef idx="3">
+            <a:schemeClr val="accent1"/>
+          </a:fillRef>
+          <a:effectRef idx="2">
+            <a:schemeClr val="accent1"/>
+          </a:effectRef>
+          <a:fontRef idx="minor">
+            <a:schemeClr val="lt1"/>
+          </a:fontRef>
+        </p:style>
+        <p:txBody>
+          <a:bodyPr rtlCol="0" anchor="ctr"/>
+          <a:lstStyle/>
+          <a:p>
+            <a:pPr algn="ctr"/>
+            <a:endParaRPr lang="en-US">
+              <a:solidFill>
+                <a:schemeClr val="tx1"/>
+              </a:solidFill>
+            </a:endParaRPr>
+          </a:p>
+        </p:txBody>
+      </p:sp>
+      <p:sp>
+        <p:nvSpPr>
+          <p:cNvPr id="21" name="Rectangle 20"/>
+          <p:cNvSpPr/>
+          <p:nvPr/>
+        </p:nvSpPr>
+        <p:spPr>
+          <a:xfrm>
+            <a:off x="733309" y="804982"/>
+            <a:ext cx="2119607" cy="1217612"/>
+          </a:xfrm>
+          <a:prstGeom prst="rect">
+            <a:avLst/>
+          </a:prstGeom>
+          <a:noFill/>
+          <a:ln>
+            <a:solidFill>
+              <a:schemeClr val="accent6">
+                <a:lumMod val="50000"/>
+              </a:schemeClr>
+            </a:solidFill>
+          </a:ln>
+        </p:spPr>
+        <p:style>
+          <a:lnRef idx="1">
+            <a:schemeClr val="accent1"/>
+          </a:lnRef>
+          <a:fillRef idx="3">
+            <a:schemeClr val="accent1"/>
+          </a:fillRef>
+          <a:effectRef idx="2">
+            <a:schemeClr val="accent1"/>
+          </a:effectRef>
+          <a:fontRef idx="minor">
+            <a:schemeClr val="lt1"/>
+          </a:fontRef>
+        </p:style>
+        <p:txBody>
+          <a:bodyPr/>
+          <a:lstStyle/>
+          <a:p>
+            <a:endParaRPr lang="en-US">
+              <a:solidFill>
+                <a:srgbClr val="FF0000"/>
+              </a:solidFill>
+            </a:endParaRPr>
+          </a:p>
+        </p:txBody>
+      </p:sp>
+      <p:sp>
+        <p:nvSpPr>
+          <p:cNvPr id="24" name="Donut 23"/>
+          <p:cNvSpPr/>
+          <p:nvPr/>
+        </p:nvSpPr>
+        <p:spPr>
+          <a:xfrm>
+            <a:off x="2503485" y="1706817"/>
+            <a:ext cx="203199" cy="211666"/>
+          </a:xfrm>
+          <a:prstGeom prst="donut">
+            <a:avLst/>
+          </a:prstGeom>
+          <a:noFill/>
+          <a:ln>
+            <a:solidFill>
+              <a:srgbClr val="008000"/>
+            </a:solidFill>
+          </a:ln>
+        </p:spPr>
+        <p:style>
+          <a:lnRef idx="1">
+            <a:schemeClr val="accent1"/>
+          </a:lnRef>
+          <a:fillRef idx="3">
+            <a:schemeClr val="accent1"/>
+          </a:fillRef>
+          <a:effectRef idx="2">
+            <a:schemeClr val="accent1"/>
+          </a:effectRef>
+          <a:fontRef idx="minor">
+            <a:schemeClr val="lt1"/>
+          </a:fontRef>
+        </p:style>
+        <p:txBody>
+          <a:bodyPr rtlCol="0" anchor="ctr"/>
+          <a:lstStyle/>
+          <a:p>
+            <a:pPr algn="ctr"/>
+            <a:endParaRPr lang="en-US">
+              <a:solidFill>
+                <a:schemeClr val="tx1"/>
+              </a:solidFill>
+            </a:endParaRPr>
+          </a:p>
+        </p:txBody>
+      </p:sp>
+      <p:cxnSp>
+        <p:nvCxnSpPr>
+          <p:cNvPr id="27" name="Straight Arrow Connector 26"/>
+          <p:cNvCxnSpPr/>
+          <p:nvPr/>
+        </p:nvCxnSpPr>
+        <p:spPr>
+          <a:xfrm>
+            <a:off x="2471908" y="1556300"/>
+            <a:ext cx="304802" cy="0"/>
+          </a:xfrm>
+          <a:prstGeom prst="straightConnector1">
+            <a:avLst/>
+          </a:prstGeom>
+          <a:ln>
+            <a:solidFill>
+              <a:schemeClr val="tx2"/>
+            </a:solidFill>
+            <a:tailEnd type="arrow"/>
+          </a:ln>
+        </p:spPr>
+        <p:style>
+          <a:lnRef idx="2">
+            <a:schemeClr val="accent1"/>
+          </a:lnRef>
+          <a:fillRef idx="0">
+            <a:schemeClr val="accent1"/>
+          </a:fillRef>
+          <a:effectRef idx="1">
+            <a:schemeClr val="accent1"/>
+          </a:effectRef>
+          <a:fontRef idx="minor">
+            <a:schemeClr val="tx1"/>
+          </a:fontRef>
+        </p:style>
+      </p:cxnSp>
+      <p:cxnSp>
+        <p:nvCxnSpPr>
+          <p:cNvPr id="30" name="Straight Arrow Connector 29"/>
+          <p:cNvCxnSpPr/>
+          <p:nvPr/>
+        </p:nvCxnSpPr>
+        <p:spPr>
+          <a:xfrm>
+            <a:off x="2463334" y="1315164"/>
+            <a:ext cx="304802" cy="0"/>
+          </a:xfrm>
+          <a:prstGeom prst="straightConnector1">
+            <a:avLst/>
+          </a:prstGeom>
+          <a:ln>
+            <a:solidFill>
+              <a:schemeClr val="accent2">
+                <a:lumMod val="75000"/>
+              </a:schemeClr>
+            </a:solidFill>
+            <a:tailEnd type="arrow"/>
+          </a:ln>
+        </p:spPr>
+        <p:style>
+          <a:lnRef idx="2">
+            <a:schemeClr val="accent1"/>
+          </a:lnRef>
+          <a:fillRef idx="0">
+            <a:schemeClr val="accent1"/>
+          </a:fillRef>
+          <a:effectRef idx="1">
+            <a:schemeClr val="accent1"/>
+          </a:effectRef>
+          <a:fontRef idx="minor">
+            <a:schemeClr val="tx1"/>
+          </a:fontRef>
+        </p:style>
+      </p:cxnSp>
+      <p:sp>
+        <p:nvSpPr>
+          <p:cNvPr id="31" name="TextBox 30"/>
+          <p:cNvSpPr txBox="1"/>
+          <p:nvPr/>
+        </p:nvSpPr>
+        <p:spPr>
+          <a:xfrm>
+            <a:off x="733309" y="827988"/>
+            <a:ext cx="1545543" cy="1200329"/>
+          </a:xfrm>
+          <a:prstGeom prst="rect">
+            <a:avLst/>
+          </a:prstGeom>
+          <a:noFill/>
+        </p:spPr>
+        <p:txBody>
+          <a:bodyPr wrap="square" rtlCol="0">
+            <a:spAutoFit/>
+          </a:bodyPr>
+          <a:lstStyle/>
+          <a:p>
+            <a:r>
+              <a:rPr lang="en-US" dirty="0" smtClean="0"/>
+              <a:t>Robot</a:t>
+            </a:r>
+          </a:p>
+          <a:p>
+            <a:r>
+              <a:rPr lang="en-US" dirty="0" smtClean="0"/>
+              <a:t>Bottom Path</a:t>
+            </a:r>
+          </a:p>
+          <a:p>
+            <a:r>
+              <a:rPr lang="en-US" dirty="0" smtClean="0"/>
+              <a:t>Top Path</a:t>
+            </a:r>
+          </a:p>
+          <a:p>
+            <a:r>
+              <a:rPr lang="en-US" dirty="0" smtClean="0"/>
+              <a:t>Goal Positions</a:t>
+            </a:r>
+            <a:endParaRPr lang="en-US" dirty="0"/>
+          </a:p>
+        </p:txBody>
+      </p:sp>
+    </p:spTree>
+    <p:extLst>
+      <p:ext uri="{BB962C8B-B14F-4D97-AF65-F5344CB8AC3E}">
+        <p14:creationId xmlns:p14="http://schemas.microsoft.com/office/powerpoint/2010/main" val="442464281"/>
+      </p:ext>
+    </p:extLst>
+  </p:cSld>
+  <p:clrMapOvr>
+    <a:masterClrMapping/>
+  </p:clrMapOvr>
+</p:sld>
+</file>
+
+<file path=ppt/slides/slide6.xml><?xml version="1.0" encoding="utf-8"?>
+<p:sld xmlns:a="http://schemas.openxmlformats.org/drawingml/2006/main" xmlns:r="http://schemas.openxmlformats.org/officeDocument/2006/relationships" xmlns:p="http://schemas.openxmlformats.org/presentationml/2006/main">
+  <p:cSld>
+    <p:spTree>
+      <p:nvGrpSpPr>
+        <p:cNvPr id="1" name=""/>
+        <p:cNvGrpSpPr/>
+        <p:nvPr/>
+      </p:nvGrpSpPr>
+      <p:grpSpPr>
+        <a:xfrm>
+          <a:off x="0" y="0"/>
+          <a:ext cx="0" cy="0"/>
+          <a:chOff x="0" y="0"/>
+          <a:chExt cx="0" cy="0"/>
+        </a:xfrm>
+      </p:grpSpPr>
+      <p:pic>
+        <p:nvPicPr>
+          <p:cNvPr id="4" name="Picture 3" descr="twoR_3.jpg"/>
+          <p:cNvPicPr>
+            <a:picLocks noChangeAspect="1"/>
+          </p:cNvPicPr>
+          <p:nvPr/>
+        </p:nvPicPr>
+        <p:blipFill>
+          <a:blip r:embed="rId2">
+            <a:extLst>
+              <a:ext uri="{28A0092B-C50C-407E-A947-70E740481C1C}">
+                <a14:useLocalDpi xmlns:a14="http://schemas.microsoft.com/office/drawing/2010/main" val="0"/>
+              </a:ext>
+            </a:extLst>
+          </a:blip>
+          <a:stretch>
+            <a:fillRect/>
+          </a:stretch>
+        </p:blipFill>
+        <p:spPr>
+          <a:xfrm>
+            <a:off x="0" y="0"/>
+            <a:ext cx="8712025" cy="6858000"/>
+          </a:xfrm>
+          <a:prstGeom prst="rect">
+            <a:avLst/>
+          </a:prstGeom>
+        </p:spPr>
+      </p:pic>
+      <p:sp>
+        <p:nvSpPr>
+          <p:cNvPr id="5" name="Oval 4"/>
+          <p:cNvSpPr/>
+          <p:nvPr/>
+        </p:nvSpPr>
+        <p:spPr>
+          <a:xfrm>
+            <a:off x="5196145" y="2692551"/>
+            <a:ext cx="455694" cy="491602"/>
+          </a:xfrm>
+          <a:prstGeom prst="ellipse">
+            <a:avLst/>
+          </a:prstGeom>
+          <a:noFill/>
+          <a:ln w="76200" cmpd="sng">
+            <a:solidFill>
+              <a:srgbClr val="008000"/>
+            </a:solidFill>
+          </a:ln>
+        </p:spPr>
+        <p:style>
+          <a:lnRef idx="1">
+            <a:schemeClr val="accent1"/>
+          </a:lnRef>
+          <a:fillRef idx="3">
+            <a:schemeClr val="accent1"/>
+          </a:fillRef>
+          <a:effectRef idx="2">
+            <a:schemeClr val="accent1"/>
+          </a:effectRef>
+          <a:fontRef idx="minor">
+            <a:schemeClr val="lt1"/>
+          </a:fontRef>
+        </p:style>
+        <p:txBody>
+          <a:bodyPr rtlCol="0" anchor="ctr"/>
+          <a:lstStyle/>
+          <a:p>
+            <a:pPr algn="ctr"/>
+            <a:endParaRPr lang="en-US"/>
+          </a:p>
+        </p:txBody>
+      </p:sp>
+      <p:sp>
+        <p:nvSpPr>
+          <p:cNvPr id="6" name="Oval 5"/>
+          <p:cNvSpPr/>
+          <p:nvPr/>
+        </p:nvSpPr>
+        <p:spPr>
+          <a:xfrm>
+            <a:off x="4381963" y="1905457"/>
+            <a:ext cx="455694" cy="491602"/>
+          </a:xfrm>
+          <a:prstGeom prst="ellipse">
+            <a:avLst/>
+          </a:prstGeom>
+          <a:noFill/>
+          <a:ln w="76200" cmpd="sng">
+            <a:solidFill>
+              <a:srgbClr val="008000"/>
+            </a:solidFill>
+          </a:ln>
+        </p:spPr>
+        <p:style>
+          <a:lnRef idx="1">
+            <a:schemeClr val="accent1"/>
+          </a:lnRef>
+          <a:fillRef idx="3">
+            <a:schemeClr val="accent1"/>
+          </a:fillRef>
+          <a:effectRef idx="2">
+            <a:schemeClr val="accent1"/>
+          </a:effectRef>
+          <a:fontRef idx="minor">
+            <a:schemeClr val="lt1"/>
+          </a:fontRef>
+        </p:style>
+        <p:txBody>
+          <a:bodyPr rtlCol="0" anchor="ctr"/>
+          <a:lstStyle/>
+          <a:p>
+            <a:pPr algn="ctr"/>
+            <a:endParaRPr lang="en-US"/>
+          </a:p>
+        </p:txBody>
+      </p:sp>
+      <p:cxnSp>
+        <p:nvCxnSpPr>
+          <p:cNvPr id="10" name="Straight Arrow Connector 9"/>
+          <p:cNvCxnSpPr/>
+          <p:nvPr/>
+        </p:nvCxnSpPr>
+        <p:spPr>
+          <a:xfrm>
+            <a:off x="6814404" y="3345149"/>
+            <a:ext cx="1944636" cy="679761"/>
+          </a:xfrm>
+          <a:prstGeom prst="straightConnector1">
+            <a:avLst/>
+          </a:prstGeom>
+          <a:ln w="63500">
+            <a:solidFill>
+              <a:schemeClr val="tx2"/>
+            </a:solidFill>
+            <a:tailEnd type="stealth" w="lg" len="lg"/>
+          </a:ln>
+        </p:spPr>
+        <p:style>
+          <a:lnRef idx="2">
+            <a:schemeClr val="accent1"/>
+          </a:lnRef>
+          <a:fillRef idx="0">
+            <a:schemeClr val="accent1"/>
+          </a:fillRef>
+          <a:effectRef idx="1">
+            <a:schemeClr val="accent1"/>
+          </a:effectRef>
+          <a:fontRef idx="minor">
+            <a:schemeClr val="tx1"/>
+          </a:fontRef>
+        </p:style>
+      </p:cxnSp>
+      <p:cxnSp>
+        <p:nvCxnSpPr>
+          <p:cNvPr id="11" name="Straight Arrow Connector 10"/>
+          <p:cNvCxnSpPr/>
+          <p:nvPr/>
+        </p:nvCxnSpPr>
+        <p:spPr>
+          <a:xfrm>
+            <a:off x="4873429" y="4678182"/>
+            <a:ext cx="1944636" cy="679761"/>
+          </a:xfrm>
+          <a:prstGeom prst="straightConnector1">
+            <a:avLst/>
+          </a:prstGeom>
+          <a:ln w="63500">
+            <a:solidFill>
+              <a:srgbClr val="953735"/>
+            </a:solidFill>
+            <a:tailEnd type="stealth" w="lg" len="lg"/>
+          </a:ln>
+        </p:spPr>
+        <p:style>
+          <a:lnRef idx="2">
+            <a:schemeClr val="accent1"/>
+          </a:lnRef>
+          <a:fillRef idx="0">
+            <a:schemeClr val="accent1"/>
+          </a:fillRef>
+          <a:effectRef idx="1">
+            <a:schemeClr val="accent1"/>
+          </a:effectRef>
+          <a:fontRef idx="minor">
+            <a:schemeClr val="tx1"/>
+          </a:fontRef>
+        </p:style>
+      </p:cxnSp>
+      <p:cxnSp>
+        <p:nvCxnSpPr>
+          <p:cNvPr id="12" name="Straight Arrow Connector 11"/>
+          <p:cNvCxnSpPr/>
+          <p:nvPr/>
+        </p:nvCxnSpPr>
+        <p:spPr>
+          <a:xfrm flipV="1">
+            <a:off x="6814404" y="4239572"/>
+            <a:ext cx="178856" cy="1118374"/>
+          </a:xfrm>
+          <a:prstGeom prst="straightConnector1">
+            <a:avLst/>
+          </a:prstGeom>
+          <a:ln w="63500">
+            <a:solidFill>
+              <a:srgbClr val="953735"/>
+            </a:solidFill>
+            <a:tailEnd type="stealth" w="lg" len="lg"/>
+          </a:ln>
+        </p:spPr>
+        <p:style>
+          <a:lnRef idx="2">
+            <a:schemeClr val="accent1"/>
+          </a:lnRef>
+          <a:fillRef idx="0">
+            <a:schemeClr val="accent1"/>
+          </a:fillRef>
+          <a:effectRef idx="1">
+            <a:schemeClr val="accent1"/>
+          </a:effectRef>
+          <a:fontRef idx="minor">
+            <a:schemeClr val="tx1"/>
+          </a:fontRef>
+        </p:style>
+      </p:cxnSp>
+      <p:sp>
+        <p:nvSpPr>
+          <p:cNvPr id="20" name="Donut 19"/>
+          <p:cNvSpPr/>
+          <p:nvPr/>
+        </p:nvSpPr>
+        <p:spPr>
+          <a:xfrm>
+            <a:off x="2507680" y="931990"/>
+            <a:ext cx="203199" cy="211666"/>
+          </a:xfrm>
+          <a:prstGeom prst="donut">
+            <a:avLst/>
+          </a:prstGeom>
+          <a:solidFill>
+            <a:srgbClr val="FF0000"/>
+          </a:solidFill>
+          <a:ln>
+            <a:noFill/>
+          </a:ln>
+        </p:spPr>
+        <p:style>
+          <a:lnRef idx="1">
+            <a:schemeClr val="accent1"/>
+          </a:lnRef>
+          <a:fillRef idx="3">
+            <a:schemeClr val="accent1"/>
+          </a:fillRef>
+          <a:effectRef idx="2">
+            <a:schemeClr val="accent1"/>
+          </a:effectRef>
+          <a:fontRef idx="minor">
+            <a:schemeClr val="lt1"/>
+          </a:fontRef>
+        </p:style>
+        <p:txBody>
+          <a:bodyPr rtlCol="0" anchor="ctr"/>
+          <a:lstStyle/>
+          <a:p>
+            <a:pPr algn="ctr"/>
+            <a:endParaRPr lang="en-US">
+              <a:solidFill>
+                <a:schemeClr val="tx1"/>
+              </a:solidFill>
+            </a:endParaRPr>
+          </a:p>
+        </p:txBody>
+      </p:sp>
+      <p:sp>
+        <p:nvSpPr>
+          <p:cNvPr id="21" name="Rectangle 20"/>
+          <p:cNvSpPr/>
+          <p:nvPr/>
+        </p:nvSpPr>
+        <p:spPr>
+          <a:xfrm>
+            <a:off x="733309" y="804982"/>
+            <a:ext cx="2119607" cy="1217612"/>
+          </a:xfrm>
+          <a:prstGeom prst="rect">
+            <a:avLst/>
+          </a:prstGeom>
+          <a:noFill/>
+          <a:ln>
+            <a:solidFill>
+              <a:schemeClr val="accent6">
+                <a:lumMod val="50000"/>
+              </a:schemeClr>
+            </a:solidFill>
+          </a:ln>
+        </p:spPr>
+        <p:style>
+          <a:lnRef idx="1">
+            <a:schemeClr val="accent1"/>
+          </a:lnRef>
+          <a:fillRef idx="3">
+            <a:schemeClr val="accent1"/>
+          </a:fillRef>
+          <a:effectRef idx="2">
+            <a:schemeClr val="accent1"/>
+          </a:effectRef>
+          <a:fontRef idx="minor">
+            <a:schemeClr val="lt1"/>
+          </a:fontRef>
+        </p:style>
+        <p:txBody>
+          <a:bodyPr/>
+          <a:lstStyle/>
+          <a:p>
+            <a:endParaRPr lang="en-US">
+              <a:solidFill>
+                <a:srgbClr val="FF0000"/>
+              </a:solidFill>
+            </a:endParaRPr>
+          </a:p>
+        </p:txBody>
+      </p:sp>
+      <p:sp>
+        <p:nvSpPr>
+          <p:cNvPr id="22" name="Donut 21"/>
+          <p:cNvSpPr/>
+          <p:nvPr/>
+        </p:nvSpPr>
+        <p:spPr>
+          <a:xfrm>
+            <a:off x="2503485" y="1706817"/>
+            <a:ext cx="203199" cy="211666"/>
+          </a:xfrm>
+          <a:prstGeom prst="donut">
+            <a:avLst/>
+          </a:prstGeom>
+          <a:noFill/>
+          <a:ln>
+            <a:solidFill>
+              <a:srgbClr val="008000"/>
+            </a:solidFill>
+          </a:ln>
+        </p:spPr>
+        <p:style>
+          <a:lnRef idx="1">
+            <a:schemeClr val="accent1"/>
+          </a:lnRef>
+          <a:fillRef idx="3">
+            <a:schemeClr val="accent1"/>
+          </a:fillRef>
+          <a:effectRef idx="2">
+            <a:schemeClr val="accent1"/>
+          </a:effectRef>
+          <a:fontRef idx="minor">
+            <a:schemeClr val="lt1"/>
+          </a:fontRef>
+        </p:style>
+        <p:txBody>
+          <a:bodyPr rtlCol="0" anchor="ctr"/>
+          <a:lstStyle/>
+          <a:p>
+            <a:pPr algn="ctr"/>
+            <a:endParaRPr lang="en-US">
+              <a:solidFill>
+                <a:schemeClr val="tx1"/>
+              </a:solidFill>
+            </a:endParaRPr>
+          </a:p>
+        </p:txBody>
+      </p:sp>
+      <p:cxnSp>
+        <p:nvCxnSpPr>
+          <p:cNvPr id="23" name="Straight Arrow Connector 22"/>
+          <p:cNvCxnSpPr/>
+          <p:nvPr/>
+        </p:nvCxnSpPr>
+        <p:spPr>
+          <a:xfrm>
+            <a:off x="2471908" y="1556300"/>
+            <a:ext cx="304802" cy="0"/>
+          </a:xfrm>
+          <a:prstGeom prst="straightConnector1">
+            <a:avLst/>
+          </a:prstGeom>
+          <a:ln>
+            <a:solidFill>
+              <a:schemeClr val="tx2"/>
+            </a:solidFill>
+            <a:tailEnd type="arrow"/>
+          </a:ln>
+        </p:spPr>
+        <p:style>
+          <a:lnRef idx="2">
+            <a:schemeClr val="accent1"/>
+          </a:lnRef>
+          <a:fillRef idx="0">
+            <a:schemeClr val="accent1"/>
+          </a:fillRef>
+          <a:effectRef idx="1">
+            <a:schemeClr val="accent1"/>
+          </a:effectRef>
+          <a:fontRef idx="minor">
+            <a:schemeClr val="tx1"/>
+          </a:fontRef>
+        </p:style>
+      </p:cxnSp>
+      <p:cxnSp>
+        <p:nvCxnSpPr>
+          <p:cNvPr id="24" name="Straight Arrow Connector 23"/>
+          <p:cNvCxnSpPr/>
+          <p:nvPr/>
+        </p:nvCxnSpPr>
+        <p:spPr>
+          <a:xfrm>
+            <a:off x="2463334" y="1315164"/>
+            <a:ext cx="304802" cy="0"/>
+          </a:xfrm>
+          <a:prstGeom prst="straightConnector1">
+            <a:avLst/>
+          </a:prstGeom>
+          <a:ln>
+            <a:solidFill>
+              <a:schemeClr val="accent2">
+                <a:lumMod val="75000"/>
+              </a:schemeClr>
+            </a:solidFill>
+            <a:tailEnd type="arrow"/>
+          </a:ln>
+        </p:spPr>
+        <p:style>
+          <a:lnRef idx="2">
+            <a:schemeClr val="accent1"/>
+          </a:lnRef>
+          <a:fillRef idx="0">
+            <a:schemeClr val="accent1"/>
+          </a:fillRef>
+          <a:effectRef idx="1">
+            <a:schemeClr val="accent1"/>
+          </a:effectRef>
+          <a:fontRef idx="minor">
+            <a:schemeClr val="tx1"/>
+          </a:fontRef>
+        </p:style>
+      </p:cxnSp>
+      <p:sp>
+        <p:nvSpPr>
+          <p:cNvPr id="25" name="TextBox 24"/>
+          <p:cNvSpPr txBox="1"/>
+          <p:nvPr/>
+        </p:nvSpPr>
+        <p:spPr>
+          <a:xfrm>
+            <a:off x="733309" y="827988"/>
+            <a:ext cx="1545543" cy="1200329"/>
+          </a:xfrm>
+          <a:prstGeom prst="rect">
+            <a:avLst/>
+          </a:prstGeom>
+          <a:noFill/>
+        </p:spPr>
+        <p:txBody>
+          <a:bodyPr wrap="square" rtlCol="0">
+            <a:spAutoFit/>
+          </a:bodyPr>
+          <a:lstStyle/>
+          <a:p>
+            <a:r>
+              <a:rPr lang="en-US" dirty="0" smtClean="0"/>
+              <a:t>Robot</a:t>
+            </a:r>
+          </a:p>
+          <a:p>
+            <a:r>
+              <a:rPr lang="en-US" dirty="0" smtClean="0"/>
+              <a:t>Bottom Path</a:t>
+            </a:r>
+          </a:p>
+          <a:p>
+            <a:r>
+              <a:rPr lang="en-US" dirty="0" smtClean="0"/>
+              <a:t>Top Path</a:t>
+            </a:r>
+          </a:p>
+          <a:p>
+            <a:r>
+              <a:rPr lang="en-US" dirty="0" smtClean="0"/>
+              <a:t>Goal Positions</a:t>
+            </a:r>
+            <a:endParaRPr lang="en-US" dirty="0"/>
+          </a:p>
+        </p:txBody>
+      </p:sp>
+    </p:spTree>
+    <p:extLst>
+      <p:ext uri="{BB962C8B-B14F-4D97-AF65-F5344CB8AC3E}">
+        <p14:creationId xmlns:p14="http://schemas.microsoft.com/office/powerpoint/2010/main" val="1791654964"/>
+      </p:ext>
+    </p:extLst>
+  </p:cSld>
+  <p:clrMapOvr>
+    <a:masterClrMapping/>
+  </p:clrMapOvr>
+</p:sld>
+</file>
+
+<file path=ppt/slides/slide7.xml><?xml version="1.0" encoding="utf-8"?>
+<p:sld xmlns:a="http://schemas.openxmlformats.org/drawingml/2006/main" xmlns:r="http://schemas.openxmlformats.org/officeDocument/2006/relationships" xmlns:p="http://schemas.openxmlformats.org/presentationml/2006/main">
+  <p:cSld>
+    <p:spTree>
+      <p:nvGrpSpPr>
+        <p:cNvPr id="1" name=""/>
+        <p:cNvGrpSpPr/>
+        <p:nvPr/>
+      </p:nvGrpSpPr>
+      <p:grpSpPr>
+        <a:xfrm>
+          <a:off x="0" y="0"/>
+          <a:ext cx="0" cy="0"/>
+          <a:chOff x="0" y="0"/>
+          <a:chExt cx="0" cy="0"/>
+        </a:xfrm>
+      </p:grpSpPr>
+      <p:pic>
+        <p:nvPicPr>
+          <p:cNvPr id="4" name="Picture 3" descr="twoR_2.jpg"/>
+          <p:cNvPicPr>
+            <a:picLocks noChangeAspect="1"/>
+          </p:cNvPicPr>
+          <p:nvPr/>
+        </p:nvPicPr>
+        <p:blipFill>
+          <a:blip r:embed="rId2">
+            <a:extLst>
+              <a:ext uri="{28A0092B-C50C-407E-A947-70E740481C1C}">
+                <a14:useLocalDpi xmlns:a14="http://schemas.microsoft.com/office/drawing/2010/main" val="0"/>
+              </a:ext>
+            </a:extLst>
+          </a:blip>
+          <a:stretch>
+            <a:fillRect/>
+          </a:stretch>
+        </p:blipFill>
+        <p:spPr>
+          <a:xfrm>
+            <a:off x="0" y="0"/>
+            <a:ext cx="8662984" cy="6858000"/>
+          </a:xfrm>
+          <a:prstGeom prst="rect">
+            <a:avLst/>
+          </a:prstGeom>
+        </p:spPr>
+      </p:pic>
+      <p:sp>
+        <p:nvSpPr>
+          <p:cNvPr id="5" name="Oval 4"/>
+          <p:cNvSpPr/>
+          <p:nvPr/>
+        </p:nvSpPr>
+        <p:spPr>
+          <a:xfrm>
+            <a:off x="5196145" y="2692551"/>
+            <a:ext cx="455694" cy="491602"/>
+          </a:xfrm>
+          <a:prstGeom prst="ellipse">
+            <a:avLst/>
+          </a:prstGeom>
+          <a:noFill/>
+          <a:ln w="76200" cmpd="sng">
+            <a:solidFill>
+              <a:srgbClr val="008000"/>
+            </a:solidFill>
+          </a:ln>
+        </p:spPr>
+        <p:style>
+          <a:lnRef idx="1">
+            <a:schemeClr val="accent1"/>
+          </a:lnRef>
+          <a:fillRef idx="3">
+            <a:schemeClr val="accent1"/>
+          </a:fillRef>
+          <a:effectRef idx="2">
+            <a:schemeClr val="accent1"/>
+          </a:effectRef>
+          <a:fontRef idx="minor">
+            <a:schemeClr val="lt1"/>
+          </a:fontRef>
+        </p:style>
+        <p:txBody>
+          <a:bodyPr rtlCol="0" anchor="ctr"/>
+          <a:lstStyle/>
+          <a:p>
+            <a:pPr algn="ctr"/>
+            <a:endParaRPr lang="en-US"/>
+          </a:p>
+        </p:txBody>
+      </p:sp>
+      <p:sp>
+        <p:nvSpPr>
+          <p:cNvPr id="6" name="Oval 5"/>
+          <p:cNvSpPr/>
+          <p:nvPr/>
+        </p:nvSpPr>
+        <p:spPr>
+          <a:xfrm>
+            <a:off x="4381963" y="1905457"/>
+            <a:ext cx="455694" cy="491602"/>
+          </a:xfrm>
+          <a:prstGeom prst="ellipse">
+            <a:avLst/>
+          </a:prstGeom>
+          <a:noFill/>
+          <a:ln w="76200" cmpd="sng">
+            <a:solidFill>
+              <a:srgbClr val="008000"/>
+            </a:solidFill>
+          </a:ln>
+        </p:spPr>
+        <p:style>
+          <a:lnRef idx="1">
+            <a:schemeClr val="accent1"/>
+          </a:lnRef>
+          <a:fillRef idx="3">
+            <a:schemeClr val="accent1"/>
+          </a:fillRef>
+          <a:effectRef idx="2">
+            <a:schemeClr val="accent1"/>
+          </a:effectRef>
+          <a:fontRef idx="minor">
+            <a:schemeClr val="lt1"/>
+          </a:fontRef>
+        </p:style>
+        <p:txBody>
+          <a:bodyPr rtlCol="0" anchor="ctr"/>
+          <a:lstStyle/>
+          <a:p>
+            <a:pPr algn="ctr"/>
+            <a:endParaRPr lang="en-US"/>
+          </a:p>
+        </p:txBody>
+      </p:sp>
+      <p:cxnSp>
+        <p:nvCxnSpPr>
+          <p:cNvPr id="16" name="Straight Arrow Connector 15"/>
+          <p:cNvCxnSpPr/>
+          <p:nvPr/>
+        </p:nvCxnSpPr>
+        <p:spPr>
+          <a:xfrm>
+            <a:off x="6814404" y="3345149"/>
+            <a:ext cx="1944636" cy="679761"/>
+          </a:xfrm>
+          <a:prstGeom prst="straightConnector1">
+            <a:avLst/>
+          </a:prstGeom>
+          <a:ln w="63500">
+            <a:solidFill>
+              <a:schemeClr val="tx2"/>
+            </a:solidFill>
+            <a:tailEnd type="stealth" w="lg" len="lg"/>
+          </a:ln>
+        </p:spPr>
+        <p:style>
+          <a:lnRef idx="2">
+            <a:schemeClr val="accent1"/>
+          </a:lnRef>
+          <a:fillRef idx="0">
+            <a:schemeClr val="accent1"/>
+          </a:fillRef>
+          <a:effectRef idx="1">
+            <a:schemeClr val="accent1"/>
+          </a:effectRef>
+          <a:fontRef idx="minor">
+            <a:schemeClr val="tx1"/>
+          </a:fontRef>
+        </p:style>
+      </p:cxnSp>
+      <p:cxnSp>
+        <p:nvCxnSpPr>
+          <p:cNvPr id="17" name="Straight Arrow Connector 16"/>
+          <p:cNvCxnSpPr/>
+          <p:nvPr/>
+        </p:nvCxnSpPr>
+        <p:spPr>
+          <a:xfrm>
+            <a:off x="4873429" y="4678182"/>
+            <a:ext cx="1944636" cy="679761"/>
+          </a:xfrm>
+          <a:prstGeom prst="straightConnector1">
+            <a:avLst/>
+          </a:prstGeom>
+          <a:ln w="63500">
+            <a:solidFill>
+              <a:srgbClr val="953735"/>
+            </a:solidFill>
+            <a:tailEnd type="stealth" w="lg" len="lg"/>
+          </a:ln>
+        </p:spPr>
+        <p:style>
+          <a:lnRef idx="2">
+            <a:schemeClr val="accent1"/>
+          </a:lnRef>
+          <a:fillRef idx="0">
+            <a:schemeClr val="accent1"/>
+          </a:fillRef>
+          <a:effectRef idx="1">
+            <a:schemeClr val="accent1"/>
+          </a:effectRef>
+          <a:fontRef idx="minor">
+            <a:schemeClr val="tx1"/>
+          </a:fontRef>
+        </p:style>
+      </p:cxnSp>
+      <p:cxnSp>
+        <p:nvCxnSpPr>
+          <p:cNvPr id="27" name="Straight Arrow Connector 26"/>
+          <p:cNvCxnSpPr/>
+          <p:nvPr/>
+        </p:nvCxnSpPr>
+        <p:spPr>
+          <a:xfrm flipV="1">
+            <a:off x="6814404" y="4239572"/>
+            <a:ext cx="178856" cy="1118374"/>
+          </a:xfrm>
+          <a:prstGeom prst="straightConnector1">
+            <a:avLst/>
+          </a:prstGeom>
+          <a:ln w="63500">
+            <a:solidFill>
+              <a:srgbClr val="953735"/>
+            </a:solidFill>
+            <a:tailEnd type="stealth" w="lg" len="lg"/>
+          </a:ln>
+        </p:spPr>
+        <p:style>
+          <a:lnRef idx="2">
+            <a:schemeClr val="accent1"/>
+          </a:lnRef>
+          <a:fillRef idx="0">
+            <a:schemeClr val="accent1"/>
+          </a:fillRef>
+          <a:effectRef idx="1">
+            <a:schemeClr val="accent1"/>
+          </a:effectRef>
+          <a:fontRef idx="minor">
+            <a:schemeClr val="tx1"/>
+          </a:fontRef>
+        </p:style>
+      </p:cxnSp>
+      <p:cxnSp>
+        <p:nvCxnSpPr>
+          <p:cNvPr id="30" name="Straight Arrow Connector 29"/>
+          <p:cNvCxnSpPr/>
+          <p:nvPr/>
+        </p:nvCxnSpPr>
+        <p:spPr>
+          <a:xfrm flipV="1">
+            <a:off x="6993260" y="3881802"/>
+            <a:ext cx="89428" cy="357770"/>
+          </a:xfrm>
+          <a:prstGeom prst="straightConnector1">
+            <a:avLst/>
+          </a:prstGeom>
+          <a:ln w="63500">
+            <a:solidFill>
+              <a:srgbClr val="953735"/>
+            </a:solidFill>
+            <a:tailEnd type="stealth" w="lg" len="lg"/>
+          </a:ln>
+        </p:spPr>
+        <p:style>
+          <a:lnRef idx="2">
+            <a:schemeClr val="accent1"/>
+          </a:lnRef>
+          <a:fillRef idx="0">
+            <a:schemeClr val="accent1"/>
+          </a:fillRef>
+          <a:effectRef idx="1">
+            <a:schemeClr val="accent1"/>
+          </a:effectRef>
+          <a:fontRef idx="minor">
+            <a:schemeClr val="tx1"/>
+          </a:fontRef>
+        </p:style>
+      </p:cxnSp>
+      <p:sp>
+        <p:nvSpPr>
+          <p:cNvPr id="34" name="Donut 33"/>
+          <p:cNvSpPr/>
+          <p:nvPr/>
+        </p:nvSpPr>
+        <p:spPr>
+          <a:xfrm>
+            <a:off x="2507680" y="931990"/>
+            <a:ext cx="203199" cy="211666"/>
+          </a:xfrm>
+          <a:prstGeom prst="donut">
+            <a:avLst/>
+          </a:prstGeom>
+          <a:solidFill>
+            <a:srgbClr val="FF0000"/>
+          </a:solidFill>
+          <a:ln>
+            <a:noFill/>
+          </a:ln>
+        </p:spPr>
+        <p:style>
+          <a:lnRef idx="1">
+            <a:schemeClr val="accent1"/>
+          </a:lnRef>
+          <a:fillRef idx="3">
+            <a:schemeClr val="accent1"/>
+          </a:fillRef>
+          <a:effectRef idx="2">
+            <a:schemeClr val="accent1"/>
+          </a:effectRef>
+          <a:fontRef idx="minor">
+            <a:schemeClr val="lt1"/>
+          </a:fontRef>
+        </p:style>
+        <p:txBody>
+          <a:bodyPr rtlCol="0" anchor="ctr"/>
+          <a:lstStyle/>
+          <a:p>
+            <a:pPr algn="ctr"/>
+            <a:endParaRPr lang="en-US">
+              <a:solidFill>
+                <a:schemeClr val="tx1"/>
+              </a:solidFill>
+            </a:endParaRPr>
+          </a:p>
+        </p:txBody>
+      </p:sp>
+      <p:sp>
+        <p:nvSpPr>
+          <p:cNvPr id="35" name="Rectangle 34"/>
+          <p:cNvSpPr/>
+          <p:nvPr/>
+        </p:nvSpPr>
+        <p:spPr>
+          <a:xfrm>
+            <a:off x="733309" y="804982"/>
+            <a:ext cx="2119607" cy="1217612"/>
+          </a:xfrm>
+          <a:prstGeom prst="rect">
+            <a:avLst/>
+          </a:prstGeom>
+          <a:noFill/>
+          <a:ln>
+            <a:solidFill>
+              <a:schemeClr val="accent6">
+                <a:lumMod val="50000"/>
+              </a:schemeClr>
+            </a:solidFill>
+          </a:ln>
+        </p:spPr>
+        <p:style>
+          <a:lnRef idx="1">
+            <a:schemeClr val="accent1"/>
+          </a:lnRef>
+          <a:fillRef idx="3">
+            <a:schemeClr val="accent1"/>
+          </a:fillRef>
+          <a:effectRef idx="2">
+            <a:schemeClr val="accent1"/>
+          </a:effectRef>
+          <a:fontRef idx="minor">
+            <a:schemeClr val="lt1"/>
+          </a:fontRef>
+        </p:style>
+        <p:txBody>
+          <a:bodyPr/>
+          <a:lstStyle/>
+          <a:p>
+            <a:endParaRPr lang="en-US">
+              <a:solidFill>
+                <a:srgbClr val="FF0000"/>
+              </a:solidFill>
+            </a:endParaRPr>
+          </a:p>
+        </p:txBody>
+      </p:sp>
+      <p:sp>
+        <p:nvSpPr>
+          <p:cNvPr id="36" name="Donut 35"/>
+          <p:cNvSpPr/>
+          <p:nvPr/>
+        </p:nvSpPr>
+        <p:spPr>
+          <a:xfrm>
+            <a:off x="2503485" y="1706817"/>
+            <a:ext cx="203199" cy="211666"/>
+          </a:xfrm>
+          <a:prstGeom prst="donut">
+            <a:avLst/>
+          </a:prstGeom>
+          <a:noFill/>
+          <a:ln>
+            <a:solidFill>
+              <a:srgbClr val="008000"/>
+            </a:solidFill>
+          </a:ln>
+        </p:spPr>
+        <p:style>
+          <a:lnRef idx="1">
+            <a:schemeClr val="accent1"/>
+          </a:lnRef>
+          <a:fillRef idx="3">
+            <a:schemeClr val="accent1"/>
+          </a:fillRef>
+          <a:effectRef idx="2">
+            <a:schemeClr val="accent1"/>
+          </a:effectRef>
+          <a:fontRef idx="minor">
+            <a:schemeClr val="lt1"/>
+          </a:fontRef>
+        </p:style>
+        <p:txBody>
+          <a:bodyPr rtlCol="0" anchor="ctr"/>
+          <a:lstStyle/>
+          <a:p>
+            <a:pPr algn="ctr"/>
+            <a:endParaRPr lang="en-US">
+              <a:solidFill>
+                <a:schemeClr val="tx1"/>
+              </a:solidFill>
+            </a:endParaRPr>
+          </a:p>
+        </p:txBody>
+      </p:sp>
+      <p:cxnSp>
+        <p:nvCxnSpPr>
+          <p:cNvPr id="37" name="Straight Arrow Connector 36"/>
+          <p:cNvCxnSpPr/>
+          <p:nvPr/>
+        </p:nvCxnSpPr>
+        <p:spPr>
+          <a:xfrm>
+            <a:off x="2471908" y="1556300"/>
+            <a:ext cx="304802" cy="0"/>
+          </a:xfrm>
+          <a:prstGeom prst="straightConnector1">
+            <a:avLst/>
+          </a:prstGeom>
+          <a:ln>
+            <a:solidFill>
+              <a:schemeClr val="tx2"/>
+            </a:solidFill>
+            <a:tailEnd type="arrow"/>
+          </a:ln>
+        </p:spPr>
+        <p:style>
+          <a:lnRef idx="2">
+            <a:schemeClr val="accent1"/>
+          </a:lnRef>
+          <a:fillRef idx="0">
+            <a:schemeClr val="accent1"/>
+          </a:fillRef>
+          <a:effectRef idx="1">
+            <a:schemeClr val="accent1"/>
+          </a:effectRef>
+          <a:fontRef idx="minor">
+            <a:schemeClr val="tx1"/>
+          </a:fontRef>
+        </p:style>
+      </p:cxnSp>
+      <p:cxnSp>
+        <p:nvCxnSpPr>
+          <p:cNvPr id="38" name="Straight Arrow Connector 37"/>
+          <p:cNvCxnSpPr/>
+          <p:nvPr/>
+        </p:nvCxnSpPr>
+        <p:spPr>
+          <a:xfrm>
+            <a:off x="2463334" y="1315164"/>
+            <a:ext cx="304802" cy="0"/>
+          </a:xfrm>
+          <a:prstGeom prst="straightConnector1">
+            <a:avLst/>
+          </a:prstGeom>
+          <a:ln>
+            <a:solidFill>
+              <a:schemeClr val="accent2">
+                <a:lumMod val="75000"/>
+              </a:schemeClr>
+            </a:solidFill>
+            <a:tailEnd type="arrow"/>
+          </a:ln>
+        </p:spPr>
+        <p:style>
+          <a:lnRef idx="2">
+            <a:schemeClr val="accent1"/>
+          </a:lnRef>
+          <a:fillRef idx="0">
+            <a:schemeClr val="accent1"/>
+          </a:fillRef>
+          <a:effectRef idx="1">
+            <a:schemeClr val="accent1"/>
+          </a:effectRef>
+          <a:fontRef idx="minor">
+            <a:schemeClr val="tx1"/>
+          </a:fontRef>
+        </p:style>
+      </p:cxnSp>
+      <p:sp>
+        <p:nvSpPr>
+          <p:cNvPr id="39" name="TextBox 38"/>
+          <p:cNvSpPr txBox="1"/>
+          <p:nvPr/>
+        </p:nvSpPr>
+        <p:spPr>
+          <a:xfrm>
+            <a:off x="733309" y="827988"/>
+            <a:ext cx="1545543" cy="1200329"/>
+          </a:xfrm>
+          <a:prstGeom prst="rect">
+            <a:avLst/>
+          </a:prstGeom>
+          <a:noFill/>
+        </p:spPr>
+        <p:txBody>
+          <a:bodyPr wrap="square" rtlCol="0">
+            <a:spAutoFit/>
+          </a:bodyPr>
+          <a:lstStyle/>
+          <a:p>
+            <a:r>
+              <a:rPr lang="en-US" dirty="0" smtClean="0"/>
+              <a:t>Robot</a:t>
+            </a:r>
+          </a:p>
+          <a:p>
+            <a:r>
+              <a:rPr lang="en-US" dirty="0" smtClean="0"/>
+              <a:t>Bottom Path</a:t>
+            </a:r>
+          </a:p>
+          <a:p>
+            <a:r>
+              <a:rPr lang="en-US" dirty="0" smtClean="0"/>
+              <a:t>Top Path</a:t>
+            </a:r>
+          </a:p>
+          <a:p>
+            <a:r>
+              <a:rPr lang="en-US" dirty="0" smtClean="0"/>
+              <a:t>Goal Positions</a:t>
+            </a:r>
+            <a:endParaRPr lang="en-US" dirty="0"/>
+          </a:p>
+        </p:txBody>
+      </p:sp>
+    </p:spTree>
+    <p:extLst>
+      <p:ext uri="{BB962C8B-B14F-4D97-AF65-F5344CB8AC3E}">
+        <p14:creationId xmlns:p14="http://schemas.microsoft.com/office/powerpoint/2010/main" val="664200057"/>
+      </p:ext>
+    </p:extLst>
+  </p:cSld>
+  <p:clrMapOvr>
+    <a:masterClrMapping/>
+  </p:clrMapOvr>
+</p:sld>
+</file>
+
+<file path=ppt/slides/slide8.xml><?xml version="1.0" encoding="utf-8"?>
+<p:sld xmlns:a="http://schemas.openxmlformats.org/drawingml/2006/main" xmlns:r="http://schemas.openxmlformats.org/officeDocument/2006/relationships" xmlns:p="http://schemas.openxmlformats.org/presentationml/2006/main">
+  <p:cSld>
+    <p:spTree>
+      <p:nvGrpSpPr>
+        <p:cNvPr id="1" name=""/>
+        <p:cNvGrpSpPr/>
+        <p:nvPr/>
+      </p:nvGrpSpPr>
+      <p:grpSpPr>
+        <a:xfrm>
+          <a:off x="0" y="0"/>
+          <a:ext cx="0" cy="0"/>
+          <a:chOff x="0" y="0"/>
+          <a:chExt cx="0" cy="0"/>
+        </a:xfrm>
+      </p:grpSpPr>
+      <p:pic>
+        <p:nvPicPr>
+          <p:cNvPr id="6" name="Picture 5" descr="twoR_4.jpg"/>
+          <p:cNvPicPr>
+            <a:picLocks noChangeAspect="1"/>
+          </p:cNvPicPr>
+          <p:nvPr/>
+        </p:nvPicPr>
+        <p:blipFill>
+          <a:blip r:embed="rId2">
+            <a:extLst>
+              <a:ext uri="{28A0092B-C50C-407E-A947-70E740481C1C}">
+                <a14:useLocalDpi xmlns:a14="http://schemas.microsoft.com/office/drawing/2010/main" val="0"/>
+              </a:ext>
+            </a:extLst>
+          </a:blip>
+          <a:stretch>
+            <a:fillRect/>
+          </a:stretch>
+        </p:blipFill>
+        <p:spPr>
+          <a:xfrm>
+            <a:off x="0" y="0"/>
+            <a:ext cx="8692171" cy="6858000"/>
+          </a:xfrm>
+          <a:prstGeom prst="rect">
+            <a:avLst/>
+          </a:prstGeom>
+        </p:spPr>
+      </p:pic>
+      <p:sp>
+        <p:nvSpPr>
+          <p:cNvPr id="7" name="Oval 6"/>
+          <p:cNvSpPr/>
+          <p:nvPr/>
+        </p:nvSpPr>
+        <p:spPr>
+          <a:xfrm>
+            <a:off x="5196145" y="2692551"/>
+            <a:ext cx="455694" cy="491602"/>
+          </a:xfrm>
+          <a:prstGeom prst="ellipse">
+            <a:avLst/>
+          </a:prstGeom>
+          <a:noFill/>
+          <a:ln w="76200" cmpd="sng">
+            <a:solidFill>
+              <a:srgbClr val="008000"/>
+            </a:solidFill>
+          </a:ln>
+        </p:spPr>
+        <p:style>
+          <a:lnRef idx="1">
+            <a:schemeClr val="accent1"/>
+          </a:lnRef>
+          <a:fillRef idx="3">
+            <a:schemeClr val="accent1"/>
+          </a:fillRef>
+          <a:effectRef idx="2">
+            <a:schemeClr val="accent1"/>
+          </a:effectRef>
+          <a:fontRef idx="minor">
+            <a:schemeClr val="lt1"/>
+          </a:fontRef>
+        </p:style>
+        <p:txBody>
+          <a:bodyPr rtlCol="0" anchor="ctr"/>
+          <a:lstStyle/>
+          <a:p>
+            <a:pPr algn="ctr"/>
+            <a:endParaRPr lang="en-US"/>
+          </a:p>
+        </p:txBody>
+      </p:sp>
+      <p:sp>
+        <p:nvSpPr>
+          <p:cNvPr id="8" name="Oval 7"/>
+          <p:cNvSpPr/>
+          <p:nvPr/>
+        </p:nvSpPr>
+        <p:spPr>
+          <a:xfrm>
+            <a:off x="4381963" y="1905457"/>
+            <a:ext cx="455694" cy="491602"/>
+          </a:xfrm>
+          <a:prstGeom prst="ellipse">
+            <a:avLst/>
+          </a:prstGeom>
+          <a:noFill/>
+          <a:ln w="76200" cmpd="sng">
+            <a:solidFill>
+              <a:srgbClr val="008000"/>
+            </a:solidFill>
+          </a:ln>
+        </p:spPr>
+        <p:style>
+          <a:lnRef idx="1">
+            <a:schemeClr val="accent1"/>
+          </a:lnRef>
+          <a:fillRef idx="3">
+            <a:schemeClr val="accent1"/>
+          </a:fillRef>
+          <a:effectRef idx="2">
+            <a:schemeClr val="accent1"/>
+          </a:effectRef>
+          <a:fontRef idx="minor">
+            <a:schemeClr val="lt1"/>
+          </a:fontRef>
+        </p:style>
+        <p:txBody>
+          <a:bodyPr rtlCol="0" anchor="ctr"/>
+          <a:lstStyle/>
+          <a:p>
+            <a:pPr algn="ctr"/>
+            <a:endParaRPr lang="en-US"/>
+          </a:p>
+        </p:txBody>
+      </p:sp>
+      <p:cxnSp>
+        <p:nvCxnSpPr>
+          <p:cNvPr id="13" name="Straight Arrow Connector 12"/>
+          <p:cNvCxnSpPr/>
+          <p:nvPr/>
+        </p:nvCxnSpPr>
+        <p:spPr>
+          <a:xfrm>
+            <a:off x="6814404" y="3345149"/>
+            <a:ext cx="1944636" cy="679761"/>
+          </a:xfrm>
+          <a:prstGeom prst="straightConnector1">
+            <a:avLst/>
+          </a:prstGeom>
+          <a:ln w="63500">
+            <a:solidFill>
+              <a:schemeClr val="tx2"/>
+            </a:solidFill>
+            <a:tailEnd type="stealth" w="lg" len="lg"/>
+          </a:ln>
+        </p:spPr>
+        <p:style>
+          <a:lnRef idx="2">
+            <a:schemeClr val="accent1"/>
+          </a:lnRef>
+          <a:fillRef idx="0">
+            <a:schemeClr val="accent1"/>
+          </a:fillRef>
+          <a:effectRef idx="1">
+            <a:schemeClr val="accent1"/>
+          </a:effectRef>
+          <a:fontRef idx="minor">
+            <a:schemeClr val="tx1"/>
+          </a:fontRef>
+        </p:style>
+      </p:cxnSp>
+      <p:cxnSp>
+        <p:nvCxnSpPr>
+          <p:cNvPr id="14" name="Straight Arrow Connector 13"/>
+          <p:cNvCxnSpPr/>
+          <p:nvPr/>
+        </p:nvCxnSpPr>
+        <p:spPr>
+          <a:xfrm>
+            <a:off x="4873429" y="4678182"/>
+            <a:ext cx="1944636" cy="679761"/>
+          </a:xfrm>
+          <a:prstGeom prst="straightConnector1">
+            <a:avLst/>
+          </a:prstGeom>
+          <a:ln w="63500">
+            <a:solidFill>
+              <a:srgbClr val="953735"/>
+            </a:solidFill>
+            <a:tailEnd type="stealth" w="lg" len="lg"/>
+          </a:ln>
+        </p:spPr>
+        <p:style>
+          <a:lnRef idx="2">
+            <a:schemeClr val="accent1"/>
+          </a:lnRef>
+          <a:fillRef idx="0">
+            <a:schemeClr val="accent1"/>
+          </a:fillRef>
+          <a:effectRef idx="1">
+            <a:schemeClr val="accent1"/>
+          </a:effectRef>
+          <a:fontRef idx="minor">
+            <a:schemeClr val="tx1"/>
+          </a:fontRef>
+        </p:style>
+      </p:cxnSp>
+      <p:cxnSp>
+        <p:nvCxnSpPr>
+          <p:cNvPr id="15" name="Straight Arrow Connector 14"/>
+          <p:cNvCxnSpPr/>
+          <p:nvPr/>
+        </p:nvCxnSpPr>
+        <p:spPr>
+          <a:xfrm flipV="1">
+            <a:off x="6814404" y="4239572"/>
+            <a:ext cx="178856" cy="1118374"/>
+          </a:xfrm>
+          <a:prstGeom prst="straightConnector1">
+            <a:avLst/>
+          </a:prstGeom>
+          <a:ln w="63500">
+            <a:solidFill>
+              <a:srgbClr val="953735"/>
+            </a:solidFill>
+            <a:tailEnd type="stealth" w="lg" len="lg"/>
+          </a:ln>
+        </p:spPr>
+        <p:style>
+          <a:lnRef idx="2">
+            <a:schemeClr val="accent1"/>
+          </a:lnRef>
+          <a:fillRef idx="0">
+            <a:schemeClr val="accent1"/>
+          </a:fillRef>
+          <a:effectRef idx="1">
+            <a:schemeClr val="accent1"/>
+          </a:effectRef>
+          <a:fontRef idx="minor">
+            <a:schemeClr val="tx1"/>
+          </a:fontRef>
+        </p:style>
+      </p:cxnSp>
+      <p:cxnSp>
+        <p:nvCxnSpPr>
+          <p:cNvPr id="16" name="Straight Arrow Connector 15"/>
+          <p:cNvCxnSpPr/>
+          <p:nvPr/>
+        </p:nvCxnSpPr>
+        <p:spPr>
+          <a:xfrm flipV="1">
+            <a:off x="6993260" y="3881802"/>
+            <a:ext cx="89428" cy="357770"/>
+          </a:xfrm>
+          <a:prstGeom prst="straightConnector1">
+            <a:avLst/>
+          </a:prstGeom>
+          <a:ln w="63500">
+            <a:solidFill>
+              <a:srgbClr val="953735"/>
+            </a:solidFill>
+            <a:tailEnd type="stealth" w="lg" len="lg"/>
+          </a:ln>
+        </p:spPr>
+        <p:style>
+          <a:lnRef idx="2">
+            <a:schemeClr val="accent1"/>
+          </a:lnRef>
+          <a:fillRef idx="0">
+            <a:schemeClr val="accent1"/>
+          </a:fillRef>
+          <a:effectRef idx="1">
+            <a:schemeClr val="accent1"/>
+          </a:effectRef>
+          <a:fontRef idx="minor">
+            <a:schemeClr val="tx1"/>
+          </a:fontRef>
+        </p:style>
+      </p:cxnSp>
+      <p:cxnSp>
+        <p:nvCxnSpPr>
+          <p:cNvPr id="23" name="Straight Arrow Connector 22"/>
+          <p:cNvCxnSpPr/>
+          <p:nvPr/>
+        </p:nvCxnSpPr>
+        <p:spPr>
+          <a:xfrm flipV="1">
+            <a:off x="7082688" y="3345149"/>
+            <a:ext cx="178856" cy="536654"/>
+          </a:xfrm>
+          <a:prstGeom prst="straightConnector1">
+            <a:avLst/>
+          </a:prstGeom>
+          <a:ln w="63500">
+            <a:solidFill>
+              <a:srgbClr val="953735"/>
+            </a:solidFill>
+            <a:tailEnd type="stealth" w="lg" len="lg"/>
+          </a:ln>
+        </p:spPr>
+        <p:style>
+          <a:lnRef idx="2">
+            <a:schemeClr val="accent1"/>
+          </a:lnRef>
+          <a:fillRef idx="0">
+            <a:schemeClr val="accent1"/>
+          </a:fillRef>
+          <a:effectRef idx="1">
+            <a:schemeClr val="accent1"/>
+          </a:effectRef>
+          <a:fontRef idx="minor">
+            <a:schemeClr val="tx1"/>
+          </a:fontRef>
+        </p:style>
+      </p:cxnSp>
+      <p:sp>
+        <p:nvSpPr>
+          <p:cNvPr id="28" name="Donut 27"/>
+          <p:cNvSpPr/>
+          <p:nvPr/>
+        </p:nvSpPr>
+        <p:spPr>
+          <a:xfrm>
+            <a:off x="2507680" y="931990"/>
+            <a:ext cx="203199" cy="211666"/>
+          </a:xfrm>
+          <a:prstGeom prst="donut">
+            <a:avLst/>
+          </a:prstGeom>
+          <a:solidFill>
+            <a:srgbClr val="FF0000"/>
+          </a:solidFill>
+          <a:ln>
+            <a:noFill/>
+          </a:ln>
+        </p:spPr>
+        <p:style>
+          <a:lnRef idx="1">
+            <a:schemeClr val="accent1"/>
+          </a:lnRef>
+          <a:fillRef idx="3">
+            <a:schemeClr val="accent1"/>
+          </a:fillRef>
+          <a:effectRef idx="2">
+            <a:schemeClr val="accent1"/>
+          </a:effectRef>
+          <a:fontRef idx="minor">
+            <a:schemeClr val="lt1"/>
+          </a:fontRef>
+        </p:style>
+        <p:txBody>
+          <a:bodyPr rtlCol="0" anchor="ctr"/>
+          <a:lstStyle/>
+          <a:p>
+            <a:pPr algn="ctr"/>
+            <a:endParaRPr lang="en-US">
+              <a:solidFill>
+                <a:schemeClr val="tx1"/>
+              </a:solidFill>
+            </a:endParaRPr>
+          </a:p>
+        </p:txBody>
+      </p:sp>
+      <p:sp>
+        <p:nvSpPr>
+          <p:cNvPr id="29" name="Rectangle 28"/>
+          <p:cNvSpPr/>
+          <p:nvPr/>
+        </p:nvSpPr>
+        <p:spPr>
+          <a:xfrm>
+            <a:off x="733309" y="804982"/>
+            <a:ext cx="2119607" cy="1217612"/>
+          </a:xfrm>
+          <a:prstGeom prst="rect">
+            <a:avLst/>
+          </a:prstGeom>
+          <a:noFill/>
+          <a:ln>
+            <a:solidFill>
+              <a:schemeClr val="accent6">
+                <a:lumMod val="50000"/>
+              </a:schemeClr>
+            </a:solidFill>
+          </a:ln>
+        </p:spPr>
+        <p:style>
+          <a:lnRef idx="1">
+            <a:schemeClr val="accent1"/>
+          </a:lnRef>
+          <a:fillRef idx="3">
+            <a:schemeClr val="accent1"/>
+          </a:fillRef>
+          <a:effectRef idx="2">
+            <a:schemeClr val="accent1"/>
+          </a:effectRef>
+          <a:fontRef idx="minor">
+            <a:schemeClr val="lt1"/>
+          </a:fontRef>
+        </p:style>
+        <p:txBody>
+          <a:bodyPr/>
+          <a:lstStyle/>
+          <a:p>
+            <a:endParaRPr lang="en-US">
+              <a:solidFill>
+                <a:srgbClr val="FF0000"/>
+              </a:solidFill>
+            </a:endParaRPr>
+          </a:p>
+        </p:txBody>
+      </p:sp>
+      <p:sp>
+        <p:nvSpPr>
+          <p:cNvPr id="30" name="Donut 29"/>
+          <p:cNvSpPr/>
+          <p:nvPr/>
+        </p:nvSpPr>
+        <p:spPr>
+          <a:xfrm>
+            <a:off x="2503485" y="1706817"/>
+            <a:ext cx="203199" cy="211666"/>
+          </a:xfrm>
+          <a:prstGeom prst="donut">
+            <a:avLst/>
+          </a:prstGeom>
+          <a:noFill/>
+          <a:ln>
+            <a:solidFill>
+              <a:srgbClr val="008000"/>
+            </a:solidFill>
+          </a:ln>
+        </p:spPr>
+        <p:style>
+          <a:lnRef idx="1">
+            <a:schemeClr val="accent1"/>
+          </a:lnRef>
+          <a:fillRef idx="3">
+            <a:schemeClr val="accent1"/>
+          </a:fillRef>
+          <a:effectRef idx="2">
+            <a:schemeClr val="accent1"/>
+          </a:effectRef>
+          <a:fontRef idx="minor">
+            <a:schemeClr val="lt1"/>
+          </a:fontRef>
+        </p:style>
+        <p:txBody>
+          <a:bodyPr rtlCol="0" anchor="ctr"/>
+          <a:lstStyle/>
+          <a:p>
+            <a:pPr algn="ctr"/>
+            <a:endParaRPr lang="en-US">
+              <a:solidFill>
+                <a:schemeClr val="tx1"/>
+              </a:solidFill>
+            </a:endParaRPr>
+          </a:p>
+        </p:txBody>
+      </p:sp>
+      <p:cxnSp>
+        <p:nvCxnSpPr>
+          <p:cNvPr id="31" name="Straight Arrow Connector 30"/>
+          <p:cNvCxnSpPr/>
+          <p:nvPr/>
+        </p:nvCxnSpPr>
+        <p:spPr>
+          <a:xfrm>
+            <a:off x="2471908" y="1556300"/>
+            <a:ext cx="304802" cy="0"/>
+          </a:xfrm>
+          <a:prstGeom prst="straightConnector1">
+            <a:avLst/>
+          </a:prstGeom>
+          <a:ln>
+            <a:solidFill>
+              <a:schemeClr val="tx2"/>
+            </a:solidFill>
+            <a:tailEnd type="arrow"/>
+          </a:ln>
+        </p:spPr>
+        <p:style>
+          <a:lnRef idx="2">
+            <a:schemeClr val="accent1"/>
+          </a:lnRef>
+          <a:fillRef idx="0">
+            <a:schemeClr val="accent1"/>
+          </a:fillRef>
+          <a:effectRef idx="1">
+            <a:schemeClr val="accent1"/>
+          </a:effectRef>
+          <a:fontRef idx="minor">
+            <a:schemeClr val="tx1"/>
+          </a:fontRef>
+        </p:style>
+      </p:cxnSp>
+      <p:cxnSp>
+        <p:nvCxnSpPr>
+          <p:cNvPr id="32" name="Straight Arrow Connector 31"/>
+          <p:cNvCxnSpPr/>
+          <p:nvPr/>
+        </p:nvCxnSpPr>
+        <p:spPr>
+          <a:xfrm>
+            <a:off x="2463334" y="1315164"/>
+            <a:ext cx="304802" cy="0"/>
+          </a:xfrm>
+          <a:prstGeom prst="straightConnector1">
+            <a:avLst/>
+          </a:prstGeom>
+          <a:ln>
+            <a:solidFill>
+              <a:schemeClr val="accent2">
+                <a:lumMod val="75000"/>
+              </a:schemeClr>
+            </a:solidFill>
+            <a:tailEnd type="arrow"/>
+          </a:ln>
+        </p:spPr>
+        <p:style>
+          <a:lnRef idx="2">
+            <a:schemeClr val="accent1"/>
+          </a:lnRef>
+          <a:fillRef idx="0">
+            <a:schemeClr val="accent1"/>
+          </a:fillRef>
+          <a:effectRef idx="1">
+            <a:schemeClr val="accent1"/>
+          </a:effectRef>
+          <a:fontRef idx="minor">
+            <a:schemeClr val="tx1"/>
+          </a:fontRef>
+        </p:style>
+      </p:cxnSp>
+      <p:sp>
+        <p:nvSpPr>
+          <p:cNvPr id="33" name="TextBox 32"/>
+          <p:cNvSpPr txBox="1"/>
+          <p:nvPr/>
+        </p:nvSpPr>
+        <p:spPr>
+          <a:xfrm>
+            <a:off x="733309" y="827988"/>
+            <a:ext cx="1545543" cy="1200329"/>
+          </a:xfrm>
+          <a:prstGeom prst="rect">
+            <a:avLst/>
+          </a:prstGeom>
+          <a:noFill/>
+        </p:spPr>
+        <p:txBody>
+          <a:bodyPr wrap="square" rtlCol="0">
+            <a:spAutoFit/>
+          </a:bodyPr>
+          <a:lstStyle/>
+          <a:p>
+            <a:r>
+              <a:rPr lang="en-US" dirty="0" smtClean="0"/>
+              <a:t>Robot</a:t>
+            </a:r>
+          </a:p>
+          <a:p>
+            <a:r>
+              <a:rPr lang="en-US" dirty="0" smtClean="0"/>
+              <a:t>Bottom Path</a:t>
+            </a:r>
+          </a:p>
+          <a:p>
+            <a:r>
+              <a:rPr lang="en-US" dirty="0" smtClean="0"/>
+              <a:t>Top Path</a:t>
+            </a:r>
+          </a:p>
+          <a:p>
+            <a:r>
+              <a:rPr lang="en-US" dirty="0" smtClean="0"/>
+              <a:t>Goal Positions</a:t>
+            </a:r>
+            <a:endParaRPr lang="en-US" dirty="0"/>
+          </a:p>
+        </p:txBody>
+      </p:sp>
+    </p:spTree>
+    <p:extLst>
+      <p:ext uri="{BB962C8B-B14F-4D97-AF65-F5344CB8AC3E}">
+        <p14:creationId xmlns:p14="http://schemas.microsoft.com/office/powerpoint/2010/main" val="3814275113"/>
+      </p:ext>
+    </p:extLst>
+  </p:cSld>
+  <p:clrMapOvr>
+    <a:masterClrMapping/>
+  </p:clrMapOvr>
+</p:sld>
+</file>
+
+<file path=ppt/slides/slide9.xml><?xml version="1.0" encoding="utf-8"?>
+<p:sld xmlns:a="http://schemas.openxmlformats.org/drawingml/2006/main" xmlns:r="http://schemas.openxmlformats.org/officeDocument/2006/relationships" xmlns:p="http://schemas.openxmlformats.org/presentationml/2006/main">
+  <p:cSld>
+    <p:spTree>
+      <p:nvGrpSpPr>
+        <p:cNvPr id="1" name=""/>
+        <p:cNvGrpSpPr/>
+        <p:nvPr/>
+      </p:nvGrpSpPr>
+      <p:grpSpPr>
+        <a:xfrm>
+          <a:off x="0" y="0"/>
+          <a:ext cx="0" cy="0"/>
+          <a:chOff x="0" y="0"/>
+          <a:chExt cx="0" cy="0"/>
+        </a:xfrm>
+      </p:grpSpPr>
+      <p:pic>
+        <p:nvPicPr>
+          <p:cNvPr id="4" name="Picture 3" descr="twoR_5.jpg"/>
+          <p:cNvPicPr>
+            <a:picLocks noChangeAspect="1"/>
+          </p:cNvPicPr>
+          <p:nvPr/>
+        </p:nvPicPr>
+        <p:blipFill>
+          <a:blip r:embed="rId2">
+            <a:extLst>
+              <a:ext uri="{28A0092B-C50C-407E-A947-70E740481C1C}">
+                <a14:useLocalDpi xmlns:a14="http://schemas.microsoft.com/office/drawing/2010/main" val="0"/>
+              </a:ext>
+            </a:extLst>
+          </a:blip>
+          <a:stretch>
+            <a:fillRect/>
+          </a:stretch>
+        </p:blipFill>
+        <p:spPr>
+          <a:xfrm>
+            <a:off x="0" y="0"/>
+            <a:ext cx="8712531" cy="6858000"/>
+          </a:xfrm>
+          <a:prstGeom prst="rect">
+            <a:avLst/>
+          </a:prstGeom>
+        </p:spPr>
+      </p:pic>
+      <p:sp>
+        <p:nvSpPr>
+          <p:cNvPr id="5" name="Oval 4"/>
+          <p:cNvSpPr/>
+          <p:nvPr/>
+        </p:nvSpPr>
+        <p:spPr>
+          <a:xfrm>
+            <a:off x="5196145" y="2692551"/>
+            <a:ext cx="455694" cy="491602"/>
+          </a:xfrm>
+          <a:prstGeom prst="ellipse">
+            <a:avLst/>
+          </a:prstGeom>
+          <a:noFill/>
+          <a:ln w="76200" cmpd="sng">
+            <a:solidFill>
+              <a:srgbClr val="008000"/>
+            </a:solidFill>
+          </a:ln>
+        </p:spPr>
+        <p:style>
+          <a:lnRef idx="1">
+            <a:schemeClr val="accent1"/>
+          </a:lnRef>
+          <a:fillRef idx="3">
+            <a:schemeClr val="accent1"/>
+          </a:fillRef>
+          <a:effectRef idx="2">
+            <a:schemeClr val="accent1"/>
+          </a:effectRef>
+          <a:fontRef idx="minor">
+            <a:schemeClr val="lt1"/>
+          </a:fontRef>
+        </p:style>
+        <p:txBody>
+          <a:bodyPr rtlCol="0" anchor="ctr"/>
+          <a:lstStyle/>
+          <a:p>
+            <a:pPr algn="ctr"/>
+            <a:endParaRPr lang="en-US"/>
+          </a:p>
+        </p:txBody>
+      </p:sp>
+      <p:sp>
+        <p:nvSpPr>
+          <p:cNvPr id="6" name="Oval 5"/>
+          <p:cNvSpPr/>
+          <p:nvPr/>
+        </p:nvSpPr>
+        <p:spPr>
+          <a:xfrm>
+            <a:off x="4381963" y="1905457"/>
+            <a:ext cx="455694" cy="491602"/>
+          </a:xfrm>
+          <a:prstGeom prst="ellipse">
+            <a:avLst/>
+          </a:prstGeom>
+          <a:noFill/>
+          <a:ln w="76200" cmpd="sng">
+            <a:solidFill>
+              <a:srgbClr val="008000"/>
+            </a:solidFill>
+          </a:ln>
+        </p:spPr>
+        <p:style>
+          <a:lnRef idx="1">
+            <a:schemeClr val="accent1"/>
+          </a:lnRef>
+          <a:fillRef idx="3">
+            <a:schemeClr val="accent1"/>
+          </a:fillRef>
+          <a:effectRef idx="2">
+            <a:schemeClr val="accent1"/>
+          </a:effectRef>
+          <a:fontRef idx="minor">
+            <a:schemeClr val="lt1"/>
+          </a:fontRef>
+        </p:style>
+        <p:txBody>
+          <a:bodyPr rtlCol="0" anchor="ctr"/>
+          <a:lstStyle/>
+          <a:p>
+            <a:pPr algn="ctr"/>
+            <a:endParaRPr lang="en-US"/>
+          </a:p>
+        </p:txBody>
+      </p:sp>
+      <p:cxnSp>
+        <p:nvCxnSpPr>
+          <p:cNvPr id="11" name="Straight Arrow Connector 10"/>
+          <p:cNvCxnSpPr/>
+          <p:nvPr/>
+        </p:nvCxnSpPr>
+        <p:spPr>
+          <a:xfrm>
+            <a:off x="6814404" y="3345149"/>
+            <a:ext cx="1944636" cy="679761"/>
+          </a:xfrm>
+          <a:prstGeom prst="straightConnector1">
+            <a:avLst/>
+          </a:prstGeom>
+          <a:ln w="63500">
+            <a:solidFill>
+              <a:schemeClr val="tx2"/>
+            </a:solidFill>
+            <a:tailEnd type="stealth" w="lg" len="lg"/>
+          </a:ln>
+        </p:spPr>
+        <p:style>
+          <a:lnRef idx="2">
+            <a:schemeClr val="accent1"/>
+          </a:lnRef>
+          <a:fillRef idx="0">
+            <a:schemeClr val="accent1"/>
+          </a:fillRef>
+          <a:effectRef idx="1">
+            <a:schemeClr val="accent1"/>
+          </a:effectRef>
+          <a:fontRef idx="minor">
+            <a:schemeClr val="tx1"/>
+          </a:fontRef>
+        </p:style>
+      </p:cxnSp>
+      <p:cxnSp>
+        <p:nvCxnSpPr>
+          <p:cNvPr id="12" name="Straight Arrow Connector 11"/>
+          <p:cNvCxnSpPr/>
+          <p:nvPr/>
+        </p:nvCxnSpPr>
+        <p:spPr>
+          <a:xfrm>
+            <a:off x="4873429" y="4678182"/>
+            <a:ext cx="1944636" cy="679761"/>
+          </a:xfrm>
+          <a:prstGeom prst="straightConnector1">
+            <a:avLst/>
+          </a:prstGeom>
+          <a:ln w="63500">
+            <a:solidFill>
+              <a:schemeClr val="accent2">
+                <a:lumMod val="75000"/>
+              </a:schemeClr>
+            </a:solidFill>
+            <a:tailEnd type="stealth" w="lg" len="lg"/>
+          </a:ln>
+        </p:spPr>
+        <p:style>
+          <a:lnRef idx="2">
+            <a:schemeClr val="accent1"/>
+          </a:lnRef>
+          <a:fillRef idx="0">
+            <a:schemeClr val="accent1"/>
+          </a:fillRef>
+          <a:effectRef idx="1">
+            <a:schemeClr val="accent1"/>
+          </a:effectRef>
+          <a:fontRef idx="minor">
+            <a:schemeClr val="tx1"/>
+          </a:fontRef>
+        </p:style>
+      </p:cxnSp>
+      <p:cxnSp>
+        <p:nvCxnSpPr>
+          <p:cNvPr id="13" name="Straight Arrow Connector 12"/>
+          <p:cNvCxnSpPr/>
+          <p:nvPr/>
+        </p:nvCxnSpPr>
+        <p:spPr>
+          <a:xfrm flipV="1">
+            <a:off x="6814404" y="4239572"/>
+            <a:ext cx="178856" cy="1118374"/>
+          </a:xfrm>
+          <a:prstGeom prst="straightConnector1">
+            <a:avLst/>
+          </a:prstGeom>
+          <a:ln w="63500">
+            <a:solidFill>
+              <a:schemeClr val="accent2">
+                <a:lumMod val="75000"/>
+              </a:schemeClr>
+            </a:solidFill>
+            <a:tailEnd type="stealth" w="lg" len="lg"/>
+          </a:ln>
+        </p:spPr>
+        <p:style>
+          <a:lnRef idx="2">
+            <a:schemeClr val="accent1"/>
+          </a:lnRef>
+          <a:fillRef idx="0">
+            <a:schemeClr val="accent1"/>
+          </a:fillRef>
+          <a:effectRef idx="1">
+            <a:schemeClr val="accent1"/>
+          </a:effectRef>
+          <a:fontRef idx="minor">
+            <a:schemeClr val="tx1"/>
+          </a:fontRef>
+        </p:style>
+      </p:cxnSp>
+      <p:cxnSp>
+        <p:nvCxnSpPr>
+          <p:cNvPr id="14" name="Straight Arrow Connector 13"/>
+          <p:cNvCxnSpPr/>
+          <p:nvPr/>
+        </p:nvCxnSpPr>
+        <p:spPr>
+          <a:xfrm flipV="1">
+            <a:off x="6993260" y="3881802"/>
+            <a:ext cx="89428" cy="357770"/>
+          </a:xfrm>
+          <a:prstGeom prst="straightConnector1">
+            <a:avLst/>
+          </a:prstGeom>
+          <a:ln w="63500">
+            <a:solidFill>
+              <a:schemeClr val="accent2">
+                <a:lumMod val="75000"/>
+              </a:schemeClr>
+            </a:solidFill>
+            <a:tailEnd type="stealth" w="lg" len="lg"/>
+          </a:ln>
+        </p:spPr>
+        <p:style>
+          <a:lnRef idx="2">
+            <a:schemeClr val="accent1"/>
+          </a:lnRef>
+          <a:fillRef idx="0">
+            <a:schemeClr val="accent1"/>
+          </a:fillRef>
+          <a:effectRef idx="1">
+            <a:schemeClr val="accent1"/>
+          </a:effectRef>
+          <a:fontRef idx="minor">
+            <a:schemeClr val="tx1"/>
+          </a:fontRef>
+        </p:style>
+      </p:cxnSp>
+      <p:cxnSp>
+        <p:nvCxnSpPr>
+          <p:cNvPr id="15" name="Straight Arrow Connector 14"/>
+          <p:cNvCxnSpPr/>
+          <p:nvPr/>
+        </p:nvCxnSpPr>
+        <p:spPr>
+          <a:xfrm flipV="1">
+            <a:off x="7082688" y="3345149"/>
+            <a:ext cx="178856" cy="536654"/>
+          </a:xfrm>
+          <a:prstGeom prst="straightConnector1">
+            <a:avLst/>
+          </a:prstGeom>
+          <a:ln w="63500">
+            <a:solidFill>
+              <a:schemeClr val="accent2">
+                <a:lumMod val="75000"/>
+              </a:schemeClr>
+            </a:solidFill>
+            <a:tailEnd type="stealth" w="lg" len="lg"/>
+          </a:ln>
+        </p:spPr>
+        <p:style>
+          <a:lnRef idx="2">
+            <a:schemeClr val="accent1"/>
+          </a:lnRef>
+          <a:fillRef idx="0">
+            <a:schemeClr val="accent1"/>
+          </a:fillRef>
+          <a:effectRef idx="1">
+            <a:schemeClr val="accent1"/>
+          </a:effectRef>
+          <a:fontRef idx="minor">
+            <a:schemeClr val="tx1"/>
+          </a:fontRef>
+        </p:style>
+      </p:cxnSp>
+      <p:cxnSp>
+        <p:nvCxnSpPr>
+          <p:cNvPr id="21" name="Straight Arrow Connector 20"/>
+          <p:cNvCxnSpPr/>
+          <p:nvPr/>
+        </p:nvCxnSpPr>
+        <p:spPr>
+          <a:xfrm flipH="1" flipV="1">
+            <a:off x="4837658" y="2271841"/>
+            <a:ext cx="2423886" cy="912312"/>
+          </a:xfrm>
+          <a:prstGeom prst="straightConnector1">
+            <a:avLst/>
+          </a:prstGeom>
+          <a:ln w="63500">
+            <a:solidFill>
+              <a:schemeClr val="accent2">
+                <a:lumMod val="75000"/>
+              </a:schemeClr>
+            </a:solidFill>
+            <a:tailEnd type="stealth" w="lg" len="lg"/>
+          </a:ln>
+        </p:spPr>
+        <p:style>
+          <a:lnRef idx="2">
+            <a:schemeClr val="accent1"/>
+          </a:lnRef>
+          <a:fillRef idx="0">
+            <a:schemeClr val="accent1"/>
+          </a:fillRef>
+          <a:effectRef idx="1">
+            <a:schemeClr val="accent1"/>
+          </a:effectRef>
+          <a:fontRef idx="minor">
+            <a:schemeClr val="tx1"/>
+          </a:fontRef>
+        </p:style>
+      </p:cxnSp>
+      <p:cxnSp>
+        <p:nvCxnSpPr>
+          <p:cNvPr id="23" name="Straight Arrow Connector 22"/>
+          <p:cNvCxnSpPr/>
+          <p:nvPr/>
+        </p:nvCxnSpPr>
+        <p:spPr>
+          <a:xfrm flipH="1" flipV="1">
+            <a:off x="5602461" y="2969491"/>
+            <a:ext cx="2857416" cy="912311"/>
+          </a:xfrm>
+          <a:prstGeom prst="straightConnector1">
+            <a:avLst/>
+          </a:prstGeom>
+          <a:ln w="63500">
+            <a:solidFill>
+              <a:schemeClr val="tx2"/>
+            </a:solidFill>
+            <a:tailEnd type="stealth" w="lg" len="lg"/>
+          </a:ln>
+        </p:spPr>
+        <p:style>
+          <a:lnRef idx="2">
+            <a:schemeClr val="accent1"/>
+          </a:lnRef>
+          <a:fillRef idx="0">
+            <a:schemeClr val="accent1"/>
+          </a:fillRef>
+          <a:effectRef idx="1">
+            <a:schemeClr val="accent1"/>
+          </a:effectRef>
+          <a:fontRef idx="minor">
+            <a:schemeClr val="tx1"/>
+          </a:fontRef>
+        </p:style>
+      </p:cxnSp>
+      <p:sp>
+        <p:nvSpPr>
+          <p:cNvPr id="26" name="Donut 25"/>
+          <p:cNvSpPr/>
+          <p:nvPr/>
+        </p:nvSpPr>
+        <p:spPr>
+          <a:xfrm>
+            <a:off x="2507680" y="931990"/>
+            <a:ext cx="203199" cy="211666"/>
+          </a:xfrm>
+          <a:prstGeom prst="donut">
+            <a:avLst/>
+          </a:prstGeom>
+          <a:solidFill>
+            <a:srgbClr val="FF0000"/>
+          </a:solidFill>
+          <a:ln>
+            <a:noFill/>
+          </a:ln>
+        </p:spPr>
+        <p:style>
+          <a:lnRef idx="1">
+            <a:schemeClr val="accent1"/>
+          </a:lnRef>
+          <a:fillRef idx="3">
+            <a:schemeClr val="accent1"/>
+          </a:fillRef>
+          <a:effectRef idx="2">
+            <a:schemeClr val="accent1"/>
+          </a:effectRef>
+          <a:fontRef idx="minor">
+            <a:schemeClr val="lt1"/>
+          </a:fontRef>
+        </p:style>
+        <p:txBody>
+          <a:bodyPr rtlCol="0" anchor="ctr"/>
+          <a:lstStyle/>
+          <a:p>
+            <a:pPr algn="ctr"/>
+            <a:endParaRPr lang="en-US">
+              <a:solidFill>
+                <a:schemeClr val="tx1"/>
+              </a:solidFill>
+            </a:endParaRPr>
+          </a:p>
+        </p:txBody>
+      </p:sp>
+      <p:sp>
+        <p:nvSpPr>
+          <p:cNvPr id="27" name="Rectangle 26"/>
+          <p:cNvSpPr/>
+          <p:nvPr/>
+        </p:nvSpPr>
+        <p:spPr>
+          <a:xfrm>
+            <a:off x="733309" y="804982"/>
+            <a:ext cx="2119607" cy="1217612"/>
+          </a:xfrm>
+          <a:prstGeom prst="rect">
+            <a:avLst/>
+          </a:prstGeom>
+          <a:noFill/>
+          <a:ln>
+            <a:solidFill>
+              <a:schemeClr val="accent6">
+                <a:lumMod val="50000"/>
+              </a:schemeClr>
+            </a:solidFill>
+          </a:ln>
+        </p:spPr>
+        <p:style>
+          <a:lnRef idx="1">
+            <a:schemeClr val="accent1"/>
+          </a:lnRef>
+          <a:fillRef idx="3">
+            <a:schemeClr val="accent1"/>
+          </a:fillRef>
+          <a:effectRef idx="2">
+            <a:schemeClr val="accent1"/>
+          </a:effectRef>
+          <a:fontRef idx="minor">
+            <a:schemeClr val="lt1"/>
+          </a:fontRef>
+        </p:style>
+        <p:txBody>
+          <a:bodyPr/>
+          <a:lstStyle/>
+          <a:p>
+            <a:endParaRPr lang="en-US">
+              <a:solidFill>
+                <a:srgbClr val="FF0000"/>
+              </a:solidFill>
+            </a:endParaRPr>
+          </a:p>
+        </p:txBody>
+      </p:sp>
+      <p:sp>
+        <p:nvSpPr>
+          <p:cNvPr id="28" name="Donut 27"/>
+          <p:cNvSpPr/>
+          <p:nvPr/>
+        </p:nvSpPr>
+        <p:spPr>
+          <a:xfrm>
+            <a:off x="2503485" y="1706817"/>
+            <a:ext cx="203199" cy="211666"/>
+          </a:xfrm>
+          <a:prstGeom prst="donut">
+            <a:avLst/>
+          </a:prstGeom>
+          <a:noFill/>
+          <a:ln>
+            <a:solidFill>
+              <a:srgbClr val="008000"/>
+            </a:solidFill>
+          </a:ln>
+        </p:spPr>
+        <p:style>
+          <a:lnRef idx="1">
+            <a:schemeClr val="accent1"/>
+          </a:lnRef>
+          <a:fillRef idx="3">
+            <a:schemeClr val="accent1"/>
+          </a:fillRef>
+          <a:effectRef idx="2">
+            <a:schemeClr val="accent1"/>
+          </a:effectRef>
+          <a:fontRef idx="minor">
+            <a:schemeClr val="lt1"/>
+          </a:fontRef>
+        </p:style>
+        <p:txBody>
+          <a:bodyPr rtlCol="0" anchor="ctr"/>
+          <a:lstStyle/>
+          <a:p>
+            <a:pPr algn="ctr"/>
+            <a:endParaRPr lang="en-US">
+              <a:solidFill>
+                <a:schemeClr val="tx1"/>
+              </a:solidFill>
+            </a:endParaRPr>
+          </a:p>
+        </p:txBody>
+      </p:sp>
+      <p:cxnSp>
+        <p:nvCxnSpPr>
+          <p:cNvPr id="29" name="Straight Arrow Connector 28"/>
+          <p:cNvCxnSpPr/>
+          <p:nvPr/>
+        </p:nvCxnSpPr>
+        <p:spPr>
+          <a:xfrm>
+            <a:off x="2471908" y="1556300"/>
+            <a:ext cx="304802" cy="0"/>
+          </a:xfrm>
+          <a:prstGeom prst="straightConnector1">
+            <a:avLst/>
+          </a:prstGeom>
+          <a:ln>
+            <a:solidFill>
+              <a:schemeClr val="tx2"/>
+            </a:solidFill>
+            <a:tailEnd type="arrow"/>
+          </a:ln>
+        </p:spPr>
+        <p:style>
+          <a:lnRef idx="2">
+            <a:schemeClr val="accent1"/>
+          </a:lnRef>
+          <a:fillRef idx="0">
+            <a:schemeClr val="accent1"/>
+          </a:fillRef>
+          <a:effectRef idx="1">
+            <a:schemeClr val="accent1"/>
+          </a:effectRef>
+          <a:fontRef idx="minor">
+            <a:schemeClr val="tx1"/>
+          </a:fontRef>
+        </p:style>
+      </p:cxnSp>
+      <p:cxnSp>
+        <p:nvCxnSpPr>
+          <p:cNvPr id="30" name="Straight Arrow Connector 29"/>
+          <p:cNvCxnSpPr/>
+          <p:nvPr/>
+        </p:nvCxnSpPr>
+        <p:spPr>
+          <a:xfrm>
+            <a:off x="2463334" y="1315164"/>
+            <a:ext cx="304802" cy="0"/>
+          </a:xfrm>
+          <a:prstGeom prst="straightConnector1">
+            <a:avLst/>
+          </a:prstGeom>
+          <a:ln>
+            <a:solidFill>
+              <a:schemeClr val="accent2">
+                <a:lumMod val="75000"/>
+              </a:schemeClr>
+            </a:solidFill>
+            <a:tailEnd type="arrow"/>
+          </a:ln>
+        </p:spPr>
+        <p:style>
+          <a:lnRef idx="2">
+            <a:schemeClr val="accent1"/>
+          </a:lnRef>
+          <a:fillRef idx="0">
+            <a:schemeClr val="accent1"/>
+          </a:fillRef>
+          <a:effectRef idx="1">
+            <a:schemeClr val="accent1"/>
+          </a:effectRef>
+          <a:fontRef idx="minor">
+            <a:schemeClr val="tx1"/>
+          </a:fontRef>
+        </p:style>
+      </p:cxnSp>
+      <p:sp>
+        <p:nvSpPr>
+          <p:cNvPr id="31" name="TextBox 30"/>
+          <p:cNvSpPr txBox="1"/>
+          <p:nvPr/>
+        </p:nvSpPr>
+        <p:spPr>
+          <a:xfrm>
+            <a:off x="733309" y="827988"/>
+            <a:ext cx="1545543" cy="1200329"/>
+          </a:xfrm>
+          <a:prstGeom prst="rect">
+            <a:avLst/>
+          </a:prstGeom>
+          <a:noFill/>
+        </p:spPr>
+        <p:txBody>
+          <a:bodyPr wrap="square" rtlCol="0">
+            <a:spAutoFit/>
+          </a:bodyPr>
+          <a:lstStyle/>
+          <a:p>
+            <a:r>
+              <a:rPr lang="en-US" dirty="0" smtClean="0"/>
+              <a:t>Robot</a:t>
+            </a:r>
+          </a:p>
+          <a:p>
+            <a:r>
+              <a:rPr lang="en-US" dirty="0" smtClean="0"/>
+              <a:t>Bottom Path</a:t>
+            </a:r>
+          </a:p>
+          <a:p>
+            <a:r>
+              <a:rPr lang="en-US" dirty="0" smtClean="0"/>
+              <a:t>Top Path</a:t>
+            </a:r>
+          </a:p>
+          <a:p>
+            <a:r>
+              <a:rPr lang="en-US" dirty="0" smtClean="0"/>
+              <a:t>Goal Positions</a:t>
+            </a:r>
+            <a:endParaRPr lang="en-US" dirty="0"/>
+          </a:p>
+        </p:txBody>
+      </p:sp>
+    </p:spTree>
+    <p:extLst>
+      <p:ext uri="{BB962C8B-B14F-4D97-AF65-F5344CB8AC3E}">
+        <p14:creationId xmlns:p14="http://schemas.microsoft.com/office/powerpoint/2010/main" val="2099493331"/>
+      </p:ext>
+    </p:extLst>
+  </p:cSld>
+  <p:clrMapOvr>
+    <a:masterClrMapping/>
+  </p:clrMapOvr>
 </p:sld>
 </file>
 

</xml_diff>